<commit_message>
first complete presentation draft
</commit_message>
<xml_diff>
--- a/presentation/presentation.pptx
+++ b/presentation/presentation.pptx
@@ -5,7 +5,7 @@
     <p:sldMasterId id="2147483777" r:id="rId1"/>
   </p:sldMasterIdLst>
   <p:notesMasterIdLst>
-    <p:notesMasterId r:id="rId39"/>
+    <p:notesMasterId r:id="rId42"/>
   </p:notesMasterIdLst>
   <p:sldIdLst>
     <p:sldId id="256" r:id="rId2"/>
@@ -44,41 +44,44 @@
     <p:sldId id="296" r:id="rId35"/>
     <p:sldId id="297" r:id="rId36"/>
     <p:sldId id="295" r:id="rId37"/>
-    <p:sldId id="298" r:id="rId38"/>
+    <p:sldId id="299" r:id="rId38"/>
+    <p:sldId id="300" r:id="rId39"/>
+    <p:sldId id="301" r:id="rId40"/>
+    <p:sldId id="298" r:id="rId41"/>
   </p:sldIdLst>
   <p:sldSz cx="12192000" cy="6858000"/>
   <p:notesSz cx="6858000" cy="9144000"/>
   <p:embeddedFontLst>
     <p:embeddedFont>
-      <p:font typeface="Calibri" panose="020F0502020204030204" pitchFamily="34" charset="0"/>
-      <p:regular r:id="rId40"/>
-      <p:bold r:id="rId41"/>
-      <p:italic r:id="rId42"/>
-      <p:boldItalic r:id="rId43"/>
+      <p:font typeface="Century Gothic" panose="020B0502020202020204" pitchFamily="34" charset="0"/>
+      <p:regular r:id="rId43"/>
+      <p:bold r:id="rId44"/>
+      <p:italic r:id="rId45"/>
+      <p:boldItalic r:id="rId46"/>
     </p:embeddedFont>
     <p:embeddedFont>
-      <p:font typeface="Century Gothic" panose="020B0502020202020204" pitchFamily="34" charset="0"/>
-      <p:regular r:id="rId44"/>
-      <p:bold r:id="rId45"/>
-      <p:italic r:id="rId46"/>
-      <p:boldItalic r:id="rId47"/>
+      <p:font typeface="Wingdings 2" panose="05020102010507070707" pitchFamily="18" charset="2"/>
+      <p:regular r:id="rId47"/>
+    </p:embeddedFont>
+    <p:embeddedFont>
+      <p:font typeface="Cambria Math" panose="02040503050406030204" pitchFamily="18" charset="0"/>
+      <p:regular r:id="rId48"/>
     </p:embeddedFont>
     <p:embeddedFont>
       <p:font typeface="Roboto Light" panose="02000000000000000000" pitchFamily="2" charset="0"/>
-      <p:regular r:id="rId48"/>
-      <p:italic r:id="rId49"/>
+      <p:regular r:id="rId49"/>
+      <p:italic r:id="rId50"/>
     </p:embeddedFont>
     <p:embeddedFont>
-      <p:font typeface="Cambria Math" panose="02040503050406030204" pitchFamily="18" charset="0"/>
-      <p:regular r:id="rId50"/>
-    </p:embeddedFont>
-    <p:embeddedFont>
-      <p:font typeface="Wingdings 2" panose="05020102010507070707" pitchFamily="18" charset="2"/>
+      <p:font typeface="Calibri" panose="020F0502020204030204" pitchFamily="34" charset="0"/>
       <p:regular r:id="rId51"/>
+      <p:bold r:id="rId52"/>
+      <p:italic r:id="rId53"/>
+      <p:boldItalic r:id="rId54"/>
     </p:embeddedFont>
   </p:embeddedFontLst>
   <p:custDataLst>
-    <p:tags r:id="rId52"/>
+    <p:tags r:id="rId55"/>
   </p:custDataLst>
   <p:defaultTextStyle>
     <a:defPPr>
@@ -270,13 +273,16 @@
         <p14:section name="Ausblick" id="{58EDE193-070D-47FB-9F3A-90C760D1E494}">
           <p14:sldIdLst>
             <p14:sldId id="295"/>
+            <p14:sldId id="299"/>
+            <p14:sldId id="300"/>
+            <p14:sldId id="301"/>
             <p14:sldId id="298"/>
           </p14:sldIdLst>
         </p14:section>
       </p14:sectionLst>
     </p:ext>
     <p:ext uri="{EFAFB233-063F-42B5-8137-9DF3F51BA10A}">
-      <p15:sldGuideLst xmlns="" xmlns:p15="http://schemas.microsoft.com/office/powerpoint/2012/main">
+      <p15:sldGuideLst xmlns:p15="http://schemas.microsoft.com/office/powerpoint/2012/main" xmlns="">
         <p15:guide id="1" orient="horz" pos="2160" userDrawn="1">
           <p15:clr>
             <a:srgbClr val="A4A3A4"/>
@@ -332,6 +338,14 @@
               <a:noFill/>
             </a:ln>
           </c:spPr>
+          <c:dPt>
+            <c:idx val="23"/>
+            <c:marker>
+              <c:symbol val="diamond"/>
+              <c:size val="7"/>
+            </c:marker>
+            <c:bubble3D val="0"/>
+          </c:dPt>
           <c:cat>
             <c:numRef>
               <c:f>Tabelle1!$A$2:$A$58</c:f>
@@ -1124,11 +1138,11 @@
         </c:dLbls>
         <c:marker val="1"/>
         <c:smooth val="0"/>
-        <c:axId val="167495552"/>
-        <c:axId val="95349376"/>
+        <c:axId val="102563840"/>
+        <c:axId val="102565376"/>
       </c:lineChart>
       <c:catAx>
-        <c:axId val="167495552"/>
+        <c:axId val="102563840"/>
         <c:scaling>
           <c:orientation val="minMax"/>
         </c:scaling>
@@ -1148,7 +1162,7 @@
             <a:endParaRPr lang="de-DE"/>
           </a:p>
         </c:txPr>
-        <c:crossAx val="95349376"/>
+        <c:crossAx val="102565376"/>
         <c:crosses val="autoZero"/>
         <c:auto val="1"/>
         <c:lblAlgn val="ctr"/>
@@ -1156,7 +1170,7 @@
         <c:noMultiLvlLbl val="0"/>
       </c:catAx>
       <c:valAx>
-        <c:axId val="95349376"/>
+        <c:axId val="102565376"/>
         <c:scaling>
           <c:orientation val="minMax"/>
         </c:scaling>
@@ -1201,7 +1215,966 @@
             <a:endParaRPr lang="de-DE"/>
           </a:p>
         </c:txPr>
-        <c:crossAx val="167495552"/>
+        <c:crossAx val="102563840"/>
+        <c:crosses val="autoZero"/>
+        <c:crossBetween val="between"/>
+      </c:valAx>
+    </c:plotArea>
+    <c:legend>
+      <c:legendPos val="r"/>
+      <c:layout/>
+      <c:overlay val="0"/>
+      <c:txPr>
+        <a:bodyPr/>
+        <a:lstStyle/>
+        <a:p>
+          <a:pPr>
+            <a:defRPr sz="1400"/>
+          </a:pPr>
+          <a:endParaRPr lang="de-DE"/>
+        </a:p>
+      </c:txPr>
+    </c:legend>
+    <c:plotVisOnly val="1"/>
+    <c:dispBlanksAs val="gap"/>
+    <c:showDLblsOverMax val="0"/>
+  </c:chart>
+  <c:txPr>
+    <a:bodyPr/>
+    <a:lstStyle/>
+    <a:p>
+      <a:pPr>
+        <a:defRPr sz="1800">
+          <a:latin typeface="Roboto Light" panose="02000000000000000000" pitchFamily="2" charset="0"/>
+          <a:ea typeface="Roboto Light" panose="02000000000000000000" pitchFamily="2" charset="0"/>
+        </a:defRPr>
+      </a:pPr>
+      <a:endParaRPr lang="de-DE"/>
+    </a:p>
+  </c:txPr>
+  <c:externalData r:id="rId1">
+    <c:autoUpdate val="0"/>
+  </c:externalData>
+</c:chartSpace>
+</file>
+
+<file path=ppt/charts/chart2.xml><?xml version="1.0" encoding="utf-8"?>
+<c:chartSpace xmlns:c="http://schemas.openxmlformats.org/drawingml/2006/chart" xmlns:a="http://schemas.openxmlformats.org/drawingml/2006/main" xmlns:r="http://schemas.openxmlformats.org/officeDocument/2006/relationships">
+  <c:date1904 val="0"/>
+  <c:lang val="de-DE"/>
+  <c:roundedCorners val="0"/>
+  <mc:AlternateContent xmlns:mc="http://schemas.openxmlformats.org/markup-compatibility/2006">
+    <mc:Choice xmlns:c14="http://schemas.microsoft.com/office/drawing/2007/8/2/chart" Requires="c14">
+      <c14:style val="110"/>
+    </mc:Choice>
+    <mc:Fallback>
+      <c:style val="10"/>
+    </mc:Fallback>
+  </mc:AlternateContent>
+  <c:chart>
+    <c:autoTitleDeleted val="0"/>
+    <c:plotArea>
+      <c:layout/>
+      <c:lineChart>
+        <c:grouping val="standard"/>
+        <c:varyColors val="0"/>
+        <c:ser>
+          <c:idx val="0"/>
+          <c:order val="0"/>
+          <c:tx>
+            <c:strRef>
+              <c:f>Tabelle1!$B$1</c:f>
+              <c:strCache>
+                <c:ptCount val="1"/>
+                <c:pt idx="0">
+                  <c:v>Thread 1</c:v>
+                </c:pt>
+              </c:strCache>
+            </c:strRef>
+          </c:tx>
+          <c:spPr>
+            <a:ln w="31750">
+              <a:noFill/>
+            </a:ln>
+          </c:spPr>
+          <c:dPt>
+            <c:idx val="23"/>
+            <c:marker>
+              <c:symbol val="diamond"/>
+              <c:size val="7"/>
+            </c:marker>
+            <c:bubble3D val="0"/>
+          </c:dPt>
+          <c:cat>
+            <c:numRef>
+              <c:f>Tabelle1!$A$2:$A$58</c:f>
+              <c:numCache>
+                <c:formatCode>General</c:formatCode>
+                <c:ptCount val="57"/>
+                <c:pt idx="0">
+                  <c:v>1</c:v>
+                </c:pt>
+                <c:pt idx="1">
+                  <c:v>2</c:v>
+                </c:pt>
+                <c:pt idx="2">
+                  <c:v>3</c:v>
+                </c:pt>
+                <c:pt idx="3">
+                  <c:v>4</c:v>
+                </c:pt>
+                <c:pt idx="4">
+                  <c:v>5</c:v>
+                </c:pt>
+                <c:pt idx="5">
+                  <c:v>6</c:v>
+                </c:pt>
+                <c:pt idx="6">
+                  <c:v>7</c:v>
+                </c:pt>
+                <c:pt idx="7">
+                  <c:v>8</c:v>
+                </c:pt>
+                <c:pt idx="8">
+                  <c:v>9</c:v>
+                </c:pt>
+                <c:pt idx="9">
+                  <c:v>10</c:v>
+                </c:pt>
+                <c:pt idx="10">
+                  <c:v>11</c:v>
+                </c:pt>
+                <c:pt idx="11">
+                  <c:v>12</c:v>
+                </c:pt>
+                <c:pt idx="12">
+                  <c:v>13</c:v>
+                </c:pt>
+                <c:pt idx="13">
+                  <c:v>14</c:v>
+                </c:pt>
+                <c:pt idx="14">
+                  <c:v>15</c:v>
+                </c:pt>
+                <c:pt idx="15">
+                  <c:v>16</c:v>
+                </c:pt>
+                <c:pt idx="16">
+                  <c:v>17</c:v>
+                </c:pt>
+                <c:pt idx="17">
+                  <c:v>18</c:v>
+                </c:pt>
+                <c:pt idx="18">
+                  <c:v>19</c:v>
+                </c:pt>
+                <c:pt idx="19">
+                  <c:v>20</c:v>
+                </c:pt>
+                <c:pt idx="20">
+                  <c:v>21</c:v>
+                </c:pt>
+                <c:pt idx="21">
+                  <c:v>22</c:v>
+                </c:pt>
+                <c:pt idx="22">
+                  <c:v>23</c:v>
+                </c:pt>
+                <c:pt idx="23">
+                  <c:v>24</c:v>
+                </c:pt>
+                <c:pt idx="24">
+                  <c:v>25</c:v>
+                </c:pt>
+                <c:pt idx="25">
+                  <c:v>26</c:v>
+                </c:pt>
+                <c:pt idx="26">
+                  <c:v>27</c:v>
+                </c:pt>
+                <c:pt idx="27">
+                  <c:v>28</c:v>
+                </c:pt>
+                <c:pt idx="28">
+                  <c:v>29</c:v>
+                </c:pt>
+                <c:pt idx="29">
+                  <c:v>30</c:v>
+                </c:pt>
+                <c:pt idx="30">
+                  <c:v>31</c:v>
+                </c:pt>
+                <c:pt idx="31">
+                  <c:v>32</c:v>
+                </c:pt>
+                <c:pt idx="32">
+                  <c:v>33</c:v>
+                </c:pt>
+                <c:pt idx="33">
+                  <c:v>34</c:v>
+                </c:pt>
+                <c:pt idx="34">
+                  <c:v>35</c:v>
+                </c:pt>
+                <c:pt idx="35">
+                  <c:v>36</c:v>
+                </c:pt>
+                <c:pt idx="36">
+                  <c:v>37</c:v>
+                </c:pt>
+                <c:pt idx="37">
+                  <c:v>38</c:v>
+                </c:pt>
+                <c:pt idx="38">
+                  <c:v>39</c:v>
+                </c:pt>
+                <c:pt idx="39">
+                  <c:v>40</c:v>
+                </c:pt>
+                <c:pt idx="40">
+                  <c:v>41</c:v>
+                </c:pt>
+                <c:pt idx="41">
+                  <c:v>42</c:v>
+                </c:pt>
+                <c:pt idx="42">
+                  <c:v>43</c:v>
+                </c:pt>
+                <c:pt idx="43">
+                  <c:v>44</c:v>
+                </c:pt>
+                <c:pt idx="44">
+                  <c:v>45</c:v>
+                </c:pt>
+                <c:pt idx="45">
+                  <c:v>46</c:v>
+                </c:pt>
+                <c:pt idx="46">
+                  <c:v>47</c:v>
+                </c:pt>
+                <c:pt idx="47">
+                  <c:v>48</c:v>
+                </c:pt>
+                <c:pt idx="48">
+                  <c:v>49</c:v>
+                </c:pt>
+                <c:pt idx="49">
+                  <c:v>50</c:v>
+                </c:pt>
+                <c:pt idx="50">
+                  <c:v>51</c:v>
+                </c:pt>
+                <c:pt idx="51">
+                  <c:v>52</c:v>
+                </c:pt>
+                <c:pt idx="52">
+                  <c:v>53</c:v>
+                </c:pt>
+                <c:pt idx="53">
+                  <c:v>54</c:v>
+                </c:pt>
+                <c:pt idx="54">
+                  <c:v>55</c:v>
+                </c:pt>
+                <c:pt idx="55">
+                  <c:v>56</c:v>
+                </c:pt>
+                <c:pt idx="56">
+                  <c:v>57</c:v>
+                </c:pt>
+              </c:numCache>
+            </c:numRef>
+          </c:cat>
+          <c:val>
+            <c:numRef>
+              <c:f>Tabelle1!$B$2:$B$58</c:f>
+              <c:numCache>
+                <c:formatCode>General</c:formatCode>
+                <c:ptCount val="57"/>
+                <c:pt idx="0">
+                  <c:v>8</c:v>
+                </c:pt>
+                <c:pt idx="1">
+                  <c:v>4</c:v>
+                </c:pt>
+                <c:pt idx="2">
+                  <c:v>6</c:v>
+                </c:pt>
+                <c:pt idx="3">
+                  <c:v>21</c:v>
+                </c:pt>
+                <c:pt idx="4">
+                  <c:v>29</c:v>
+                </c:pt>
+                <c:pt idx="5">
+                  <c:v>29</c:v>
+                </c:pt>
+                <c:pt idx="6">
+                  <c:v>39</c:v>
+                </c:pt>
+                <c:pt idx="7">
+                  <c:v>34</c:v>
+                </c:pt>
+                <c:pt idx="8">
+                  <c:v>38</c:v>
+                </c:pt>
+                <c:pt idx="9">
+                  <c:v>47</c:v>
+                </c:pt>
+                <c:pt idx="10">
+                  <c:v>48</c:v>
+                </c:pt>
+                <c:pt idx="11">
+                  <c:v>49</c:v>
+                </c:pt>
+                <c:pt idx="12">
+                  <c:v>51</c:v>
+                </c:pt>
+                <c:pt idx="13">
+                  <c:v>63</c:v>
+                </c:pt>
+                <c:pt idx="14">
+                  <c:v>63</c:v>
+                </c:pt>
+                <c:pt idx="15">
+                  <c:v>67</c:v>
+                </c:pt>
+                <c:pt idx="16">
+                  <c:v>80</c:v>
+                </c:pt>
+                <c:pt idx="17">
+                  <c:v>79</c:v>
+                </c:pt>
+                <c:pt idx="18">
+                  <c:v>80</c:v>
+                </c:pt>
+                <c:pt idx="19">
+                  <c:v>84</c:v>
+                </c:pt>
+                <c:pt idx="20">
+                  <c:v>98</c:v>
+                </c:pt>
+                <c:pt idx="21">
+                  <c:v>99</c:v>
+                </c:pt>
+                <c:pt idx="22">
+                  <c:v>101</c:v>
+                </c:pt>
+                <c:pt idx="23">
+                  <c:v>218</c:v>
+                </c:pt>
+              </c:numCache>
+            </c:numRef>
+          </c:val>
+          <c:smooth val="0"/>
+        </c:ser>
+        <c:ser>
+          <c:idx val="1"/>
+          <c:order val="1"/>
+          <c:tx>
+            <c:strRef>
+              <c:f>Tabelle1!$C$1</c:f>
+              <c:strCache>
+                <c:ptCount val="1"/>
+                <c:pt idx="0">
+                  <c:v>Thread 2</c:v>
+                </c:pt>
+              </c:strCache>
+            </c:strRef>
+          </c:tx>
+          <c:spPr>
+            <a:ln w="31750">
+              <a:noFill/>
+            </a:ln>
+          </c:spPr>
+          <c:cat>
+            <c:numRef>
+              <c:f>Tabelle1!$A$2:$A$58</c:f>
+              <c:numCache>
+                <c:formatCode>General</c:formatCode>
+                <c:ptCount val="57"/>
+                <c:pt idx="0">
+                  <c:v>1</c:v>
+                </c:pt>
+                <c:pt idx="1">
+                  <c:v>2</c:v>
+                </c:pt>
+                <c:pt idx="2">
+                  <c:v>3</c:v>
+                </c:pt>
+                <c:pt idx="3">
+                  <c:v>4</c:v>
+                </c:pt>
+                <c:pt idx="4">
+                  <c:v>5</c:v>
+                </c:pt>
+                <c:pt idx="5">
+                  <c:v>6</c:v>
+                </c:pt>
+                <c:pt idx="6">
+                  <c:v>7</c:v>
+                </c:pt>
+                <c:pt idx="7">
+                  <c:v>8</c:v>
+                </c:pt>
+                <c:pt idx="8">
+                  <c:v>9</c:v>
+                </c:pt>
+                <c:pt idx="9">
+                  <c:v>10</c:v>
+                </c:pt>
+                <c:pt idx="10">
+                  <c:v>11</c:v>
+                </c:pt>
+                <c:pt idx="11">
+                  <c:v>12</c:v>
+                </c:pt>
+                <c:pt idx="12">
+                  <c:v>13</c:v>
+                </c:pt>
+                <c:pt idx="13">
+                  <c:v>14</c:v>
+                </c:pt>
+                <c:pt idx="14">
+                  <c:v>15</c:v>
+                </c:pt>
+                <c:pt idx="15">
+                  <c:v>16</c:v>
+                </c:pt>
+                <c:pt idx="16">
+                  <c:v>17</c:v>
+                </c:pt>
+                <c:pt idx="17">
+                  <c:v>18</c:v>
+                </c:pt>
+                <c:pt idx="18">
+                  <c:v>19</c:v>
+                </c:pt>
+                <c:pt idx="19">
+                  <c:v>20</c:v>
+                </c:pt>
+                <c:pt idx="20">
+                  <c:v>21</c:v>
+                </c:pt>
+                <c:pt idx="21">
+                  <c:v>22</c:v>
+                </c:pt>
+                <c:pt idx="22">
+                  <c:v>23</c:v>
+                </c:pt>
+                <c:pt idx="23">
+                  <c:v>24</c:v>
+                </c:pt>
+                <c:pt idx="24">
+                  <c:v>25</c:v>
+                </c:pt>
+                <c:pt idx="25">
+                  <c:v>26</c:v>
+                </c:pt>
+                <c:pt idx="26">
+                  <c:v>27</c:v>
+                </c:pt>
+                <c:pt idx="27">
+                  <c:v>28</c:v>
+                </c:pt>
+                <c:pt idx="28">
+                  <c:v>29</c:v>
+                </c:pt>
+                <c:pt idx="29">
+                  <c:v>30</c:v>
+                </c:pt>
+                <c:pt idx="30">
+                  <c:v>31</c:v>
+                </c:pt>
+                <c:pt idx="31">
+                  <c:v>32</c:v>
+                </c:pt>
+                <c:pt idx="32">
+                  <c:v>33</c:v>
+                </c:pt>
+                <c:pt idx="33">
+                  <c:v>34</c:v>
+                </c:pt>
+                <c:pt idx="34">
+                  <c:v>35</c:v>
+                </c:pt>
+                <c:pt idx="35">
+                  <c:v>36</c:v>
+                </c:pt>
+                <c:pt idx="36">
+                  <c:v>37</c:v>
+                </c:pt>
+                <c:pt idx="37">
+                  <c:v>38</c:v>
+                </c:pt>
+                <c:pt idx="38">
+                  <c:v>39</c:v>
+                </c:pt>
+                <c:pt idx="39">
+                  <c:v>40</c:v>
+                </c:pt>
+                <c:pt idx="40">
+                  <c:v>41</c:v>
+                </c:pt>
+                <c:pt idx="41">
+                  <c:v>42</c:v>
+                </c:pt>
+                <c:pt idx="42">
+                  <c:v>43</c:v>
+                </c:pt>
+                <c:pt idx="43">
+                  <c:v>44</c:v>
+                </c:pt>
+                <c:pt idx="44">
+                  <c:v>45</c:v>
+                </c:pt>
+                <c:pt idx="45">
+                  <c:v>46</c:v>
+                </c:pt>
+                <c:pt idx="46">
+                  <c:v>47</c:v>
+                </c:pt>
+                <c:pt idx="47">
+                  <c:v>48</c:v>
+                </c:pt>
+                <c:pt idx="48">
+                  <c:v>49</c:v>
+                </c:pt>
+                <c:pt idx="49">
+                  <c:v>50</c:v>
+                </c:pt>
+                <c:pt idx="50">
+                  <c:v>51</c:v>
+                </c:pt>
+                <c:pt idx="51">
+                  <c:v>52</c:v>
+                </c:pt>
+                <c:pt idx="52">
+                  <c:v>53</c:v>
+                </c:pt>
+                <c:pt idx="53">
+                  <c:v>54</c:v>
+                </c:pt>
+                <c:pt idx="54">
+                  <c:v>55</c:v>
+                </c:pt>
+                <c:pt idx="55">
+                  <c:v>56</c:v>
+                </c:pt>
+                <c:pt idx="56">
+                  <c:v>57</c:v>
+                </c:pt>
+              </c:numCache>
+            </c:numRef>
+          </c:cat>
+          <c:val>
+            <c:numRef>
+              <c:f>Tabelle1!$C$2:$C$58</c:f>
+              <c:numCache>
+                <c:formatCode>General</c:formatCode>
+                <c:ptCount val="57"/>
+                <c:pt idx="24">
+                  <c:v>1263</c:v>
+                </c:pt>
+                <c:pt idx="25">
+                  <c:v>935</c:v>
+                </c:pt>
+                <c:pt idx="26">
+                  <c:v>955</c:v>
+                </c:pt>
+                <c:pt idx="27">
+                  <c:v>842</c:v>
+                </c:pt>
+                <c:pt idx="28">
+                  <c:v>964</c:v>
+                </c:pt>
+                <c:pt idx="29">
+                  <c:v>1902</c:v>
+                </c:pt>
+                <c:pt idx="30">
+                  <c:v>1353</c:v>
+                </c:pt>
+                <c:pt idx="31">
+                  <c:v>1518</c:v>
+                </c:pt>
+              </c:numCache>
+            </c:numRef>
+          </c:val>
+          <c:smooth val="0"/>
+        </c:ser>
+        <c:ser>
+          <c:idx val="2"/>
+          <c:order val="2"/>
+          <c:tx>
+            <c:strRef>
+              <c:f>Tabelle1!$D$1</c:f>
+              <c:strCache>
+                <c:ptCount val="1"/>
+                <c:pt idx="0">
+                  <c:v>Thread 3</c:v>
+                </c:pt>
+              </c:strCache>
+            </c:strRef>
+          </c:tx>
+          <c:spPr>
+            <a:ln w="31750">
+              <a:noFill/>
+            </a:ln>
+          </c:spPr>
+          <c:cat>
+            <c:numRef>
+              <c:f>Tabelle1!$A$2:$A$58</c:f>
+              <c:numCache>
+                <c:formatCode>General</c:formatCode>
+                <c:ptCount val="57"/>
+                <c:pt idx="0">
+                  <c:v>1</c:v>
+                </c:pt>
+                <c:pt idx="1">
+                  <c:v>2</c:v>
+                </c:pt>
+                <c:pt idx="2">
+                  <c:v>3</c:v>
+                </c:pt>
+                <c:pt idx="3">
+                  <c:v>4</c:v>
+                </c:pt>
+                <c:pt idx="4">
+                  <c:v>5</c:v>
+                </c:pt>
+                <c:pt idx="5">
+                  <c:v>6</c:v>
+                </c:pt>
+                <c:pt idx="6">
+                  <c:v>7</c:v>
+                </c:pt>
+                <c:pt idx="7">
+                  <c:v>8</c:v>
+                </c:pt>
+                <c:pt idx="8">
+                  <c:v>9</c:v>
+                </c:pt>
+                <c:pt idx="9">
+                  <c:v>10</c:v>
+                </c:pt>
+                <c:pt idx="10">
+                  <c:v>11</c:v>
+                </c:pt>
+                <c:pt idx="11">
+                  <c:v>12</c:v>
+                </c:pt>
+                <c:pt idx="12">
+                  <c:v>13</c:v>
+                </c:pt>
+                <c:pt idx="13">
+                  <c:v>14</c:v>
+                </c:pt>
+                <c:pt idx="14">
+                  <c:v>15</c:v>
+                </c:pt>
+                <c:pt idx="15">
+                  <c:v>16</c:v>
+                </c:pt>
+                <c:pt idx="16">
+                  <c:v>17</c:v>
+                </c:pt>
+                <c:pt idx="17">
+                  <c:v>18</c:v>
+                </c:pt>
+                <c:pt idx="18">
+                  <c:v>19</c:v>
+                </c:pt>
+                <c:pt idx="19">
+                  <c:v>20</c:v>
+                </c:pt>
+                <c:pt idx="20">
+                  <c:v>21</c:v>
+                </c:pt>
+                <c:pt idx="21">
+                  <c:v>22</c:v>
+                </c:pt>
+                <c:pt idx="22">
+                  <c:v>23</c:v>
+                </c:pt>
+                <c:pt idx="23">
+                  <c:v>24</c:v>
+                </c:pt>
+                <c:pt idx="24">
+                  <c:v>25</c:v>
+                </c:pt>
+                <c:pt idx="25">
+                  <c:v>26</c:v>
+                </c:pt>
+                <c:pt idx="26">
+                  <c:v>27</c:v>
+                </c:pt>
+                <c:pt idx="27">
+                  <c:v>28</c:v>
+                </c:pt>
+                <c:pt idx="28">
+                  <c:v>29</c:v>
+                </c:pt>
+                <c:pt idx="29">
+                  <c:v>30</c:v>
+                </c:pt>
+                <c:pt idx="30">
+                  <c:v>31</c:v>
+                </c:pt>
+                <c:pt idx="31">
+                  <c:v>32</c:v>
+                </c:pt>
+                <c:pt idx="32">
+                  <c:v>33</c:v>
+                </c:pt>
+                <c:pt idx="33">
+                  <c:v>34</c:v>
+                </c:pt>
+                <c:pt idx="34">
+                  <c:v>35</c:v>
+                </c:pt>
+                <c:pt idx="35">
+                  <c:v>36</c:v>
+                </c:pt>
+                <c:pt idx="36">
+                  <c:v>37</c:v>
+                </c:pt>
+                <c:pt idx="37">
+                  <c:v>38</c:v>
+                </c:pt>
+                <c:pt idx="38">
+                  <c:v>39</c:v>
+                </c:pt>
+                <c:pt idx="39">
+                  <c:v>40</c:v>
+                </c:pt>
+                <c:pt idx="40">
+                  <c:v>41</c:v>
+                </c:pt>
+                <c:pt idx="41">
+                  <c:v>42</c:v>
+                </c:pt>
+                <c:pt idx="42">
+                  <c:v>43</c:v>
+                </c:pt>
+                <c:pt idx="43">
+                  <c:v>44</c:v>
+                </c:pt>
+                <c:pt idx="44">
+                  <c:v>45</c:v>
+                </c:pt>
+                <c:pt idx="45">
+                  <c:v>46</c:v>
+                </c:pt>
+                <c:pt idx="46">
+                  <c:v>47</c:v>
+                </c:pt>
+                <c:pt idx="47">
+                  <c:v>48</c:v>
+                </c:pt>
+                <c:pt idx="48">
+                  <c:v>49</c:v>
+                </c:pt>
+                <c:pt idx="49">
+                  <c:v>50</c:v>
+                </c:pt>
+                <c:pt idx="50">
+                  <c:v>51</c:v>
+                </c:pt>
+                <c:pt idx="51">
+                  <c:v>52</c:v>
+                </c:pt>
+                <c:pt idx="52">
+                  <c:v>53</c:v>
+                </c:pt>
+                <c:pt idx="53">
+                  <c:v>54</c:v>
+                </c:pt>
+                <c:pt idx="54">
+                  <c:v>55</c:v>
+                </c:pt>
+                <c:pt idx="55">
+                  <c:v>56</c:v>
+                </c:pt>
+                <c:pt idx="56">
+                  <c:v>57</c:v>
+                </c:pt>
+              </c:numCache>
+            </c:numRef>
+          </c:cat>
+          <c:val>
+            <c:numRef>
+              <c:f>Tabelle1!$D$2:$D$58</c:f>
+              <c:numCache>
+                <c:formatCode>General</c:formatCode>
+                <c:ptCount val="57"/>
+                <c:pt idx="32">
+                  <c:v>4735</c:v>
+                </c:pt>
+                <c:pt idx="33">
+                  <c:v>3361</c:v>
+                </c:pt>
+                <c:pt idx="34">
+                  <c:v>3394</c:v>
+                </c:pt>
+                <c:pt idx="35">
+                  <c:v>3742</c:v>
+                </c:pt>
+                <c:pt idx="36">
+                  <c:v>4256</c:v>
+                </c:pt>
+                <c:pt idx="37">
+                  <c:v>4087</c:v>
+                </c:pt>
+                <c:pt idx="38">
+                  <c:v>4592</c:v>
+                </c:pt>
+                <c:pt idx="39">
+                  <c:v>4494</c:v>
+                </c:pt>
+                <c:pt idx="40">
+                  <c:v>4743</c:v>
+                </c:pt>
+                <c:pt idx="41">
+                  <c:v>6503</c:v>
+                </c:pt>
+                <c:pt idx="42">
+                  <c:v>5741</c:v>
+                </c:pt>
+                <c:pt idx="43">
+                  <c:v>5846</c:v>
+                </c:pt>
+                <c:pt idx="44">
+                  <c:v>5754</c:v>
+                </c:pt>
+                <c:pt idx="45">
+                  <c:v>5805</c:v>
+                </c:pt>
+                <c:pt idx="46">
+                  <c:v>5865</c:v>
+                </c:pt>
+                <c:pt idx="47">
+                  <c:v>5975</c:v>
+                </c:pt>
+                <c:pt idx="48">
+                  <c:v>6023</c:v>
+                </c:pt>
+                <c:pt idx="49">
+                  <c:v>6271</c:v>
+                </c:pt>
+                <c:pt idx="50">
+                  <c:v>6173</c:v>
+                </c:pt>
+                <c:pt idx="51">
+                  <c:v>6433</c:v>
+                </c:pt>
+                <c:pt idx="52">
+                  <c:v>7344</c:v>
+                </c:pt>
+                <c:pt idx="53">
+                  <c:v>6824</c:v>
+                </c:pt>
+                <c:pt idx="54">
+                  <c:v>6952</c:v>
+                </c:pt>
+                <c:pt idx="55">
+                  <c:v>7020</c:v>
+                </c:pt>
+                <c:pt idx="56">
+                  <c:v>7043</c:v>
+                </c:pt>
+              </c:numCache>
+            </c:numRef>
+          </c:val>
+          <c:smooth val="0"/>
+        </c:ser>
+        <c:dLbls>
+          <c:showLegendKey val="0"/>
+          <c:showVal val="0"/>
+          <c:showCatName val="0"/>
+          <c:showSerName val="0"/>
+          <c:showPercent val="0"/>
+          <c:showBubbleSize val="0"/>
+        </c:dLbls>
+        <c:marker val="1"/>
+        <c:smooth val="0"/>
+        <c:axId val="3381888"/>
+        <c:axId val="44433408"/>
+      </c:lineChart>
+      <c:catAx>
+        <c:axId val="3381888"/>
+        <c:scaling>
+          <c:orientation val="minMax"/>
+        </c:scaling>
+        <c:delete val="0"/>
+        <c:axPos val="b"/>
+        <c:numFmt formatCode="General" sourceLinked="1"/>
+        <c:majorTickMark val="out"/>
+        <c:minorTickMark val="none"/>
+        <c:tickLblPos val="nextTo"/>
+        <c:txPr>
+          <a:bodyPr/>
+          <a:lstStyle/>
+          <a:p>
+            <a:pPr>
+              <a:defRPr sz="1200"/>
+            </a:pPr>
+            <a:endParaRPr lang="de-DE"/>
+          </a:p>
+        </c:txPr>
+        <c:crossAx val="44433408"/>
+        <c:crosses val="autoZero"/>
+        <c:auto val="1"/>
+        <c:lblAlgn val="ctr"/>
+        <c:lblOffset val="100"/>
+        <c:noMultiLvlLbl val="0"/>
+      </c:catAx>
+      <c:valAx>
+        <c:axId val="44433408"/>
+        <c:scaling>
+          <c:orientation val="minMax"/>
+        </c:scaling>
+        <c:delete val="0"/>
+        <c:axPos val="l"/>
+        <c:majorGridlines/>
+        <c:title>
+          <c:tx>
+            <c:rich>
+              <a:bodyPr rot="-5400000" vert="horz"/>
+              <a:lstStyle/>
+              <a:p>
+                <a:pPr>
+                  <a:defRPr sz="1200"/>
+                </a:pPr>
+                <a:r>
+                  <a:rPr lang="de-DE" sz="1200" dirty="0" err="1" smtClean="0"/>
+                  <a:t>Einfügedauer</a:t>
+                </a:r>
+                <a:r>
+                  <a:rPr lang="de-DE" sz="1200" dirty="0" smtClean="0"/>
+                  <a:t> in Sek.</a:t>
+                </a:r>
+                <a:endParaRPr lang="de-DE" sz="1200" dirty="0"/>
+              </a:p>
+            </c:rich>
+          </c:tx>
+          <c:layout/>
+          <c:overlay val="0"/>
+        </c:title>
+        <c:numFmt formatCode="General" sourceLinked="0"/>
+        <c:majorTickMark val="out"/>
+        <c:minorTickMark val="none"/>
+        <c:tickLblPos val="nextTo"/>
+        <c:txPr>
+          <a:bodyPr/>
+          <a:lstStyle/>
+          <a:p>
+            <a:pPr>
+              <a:defRPr sz="1400"/>
+            </a:pPr>
+            <a:endParaRPr lang="de-DE"/>
+          </a:p>
+        </c:txPr>
+        <c:crossAx val="3381888"/>
         <c:crosses val="autoZero"/>
         <c:crossBetween val="between"/>
       </c:valAx>
@@ -1327,7 +2300,7 @@
             <a:fld id="{070EEAC5-C180-4BB0-8CEB-D0349F56CA62}" type="datetimeFigureOut">
               <a:rPr lang="de-DE" smtClean="0"/>
               <a:pPr/>
-              <a:t>26.10.2017</a:t>
+              <a:t>27.10.2017</a:t>
             </a:fld>
             <a:endParaRPr lang="de-DE" dirty="0"/>
           </a:p>
@@ -2103,7 +3076,7 @@
           <a:p>
             <a:fld id="{BF21FDD1-FA09-4BA0-B88A-7ECBCAA800CC}" type="datetime1">
               <a:rPr lang="de-DE" smtClean="0"/>
-              <a:t>26.10.2017</a:t>
+              <a:t>27.10.2017</a:t>
             </a:fld>
             <a:endParaRPr lang="de-DE" dirty="0"/>
           </a:p>
@@ -2392,7 +3365,7 @@
           <a:p>
             <a:fld id="{036C97DE-B393-47A3-99A6-1B0C91AC8E51}" type="datetime1">
               <a:rPr lang="de-DE" smtClean="0"/>
-              <a:t>26.10.2017</a:t>
+              <a:t>27.10.2017</a:t>
             </a:fld>
             <a:endParaRPr lang="de-DE" dirty="0"/>
           </a:p>
@@ -2608,7 +3581,7 @@
           <a:p>
             <a:fld id="{93579388-70C9-498E-BC37-0CD0D4E909B8}" type="datetime1">
               <a:rPr lang="de-DE" smtClean="0"/>
-              <a:t>26.10.2017</a:t>
+              <a:t>27.10.2017</a:t>
             </a:fld>
             <a:endParaRPr lang="de-DE" dirty="0"/>
           </a:p>
@@ -2987,7 +3960,7 @@
           <a:p>
             <a:fld id="{1E2DA32B-7E9D-4942-B0A8-5FBBBE77D83D}" type="datetime1">
               <a:rPr lang="de-DE" smtClean="0"/>
-              <a:t>26.10.2017</a:t>
+              <a:t>27.10.2017</a:t>
             </a:fld>
             <a:endParaRPr lang="de-DE" dirty="0"/>
           </a:p>
@@ -3146,7 +4119,7 @@
             <a:fld id="{1217C929-59DE-4893-8992-D8FC7123675F}" type="datetime1">
               <a:rPr lang="de-DE" smtClean="0"/>
               <a:pPr/>
-              <a:t>26.10.2017</a:t>
+              <a:t>27.10.2017</a:t>
             </a:fld>
             <a:endParaRPr lang="de-DE" dirty="0"/>
           </a:p>
@@ -3249,7 +4222,7 @@
           <a:p>
             <a:fld id="{B8D6D5E1-500A-4D23-9381-FF82601E1329}" type="datetime1">
               <a:rPr lang="de-DE" smtClean="0"/>
-              <a:t>26.10.2017</a:t>
+              <a:t>27.10.2017</a:t>
             </a:fld>
             <a:endParaRPr lang="de-DE" dirty="0"/>
           </a:p>
@@ -3536,7 +4509,7 @@
           <a:p>
             <a:fld id="{9DEA69BE-655B-4CEC-8542-DBFADD7876E1}" type="datetime1">
               <a:rPr lang="de-DE" smtClean="0"/>
-              <a:t>26.10.2017</a:t>
+              <a:t>27.10.2017</a:t>
             </a:fld>
             <a:endParaRPr lang="de-DE" dirty="0"/>
           </a:p>
@@ -6887,8 +7860,8 @@
           </a:p>
         </p:txBody>
       </p:sp>
-      <mc:AlternateContent xmlns:mc="http://schemas.openxmlformats.org/markup-compatibility/2006">
-        <mc:Choice xmlns:a14="http://schemas.microsoft.com/office/drawing/2010/main" Requires="a14">
+      <mc:AlternateContent xmlns:mc="http://schemas.openxmlformats.org/markup-compatibility/2006" xmlns:a14="http://schemas.microsoft.com/office/drawing/2010/main">
+        <mc:Choice Requires="a14">
           <p:sp>
             <p:nvSpPr>
               <p:cNvPr id="9" name="Rechteck 8"/>
@@ -7110,7 +8083,7 @@
             </p:txBody>
           </p:sp>
         </mc:Choice>
-        <mc:Fallback>
+        <mc:Fallback xmlns="">
           <p:sp>
             <p:nvSpPr>
               <p:cNvPr id="9" name="Rechteck 8"/>
@@ -7230,8 +8203,8 @@
           </a:extLst>
         </p:spPr>
       </p:pic>
-      <mc:AlternateContent xmlns:mc="http://schemas.openxmlformats.org/markup-compatibility/2006">
-        <mc:Choice xmlns:a14="http://schemas.microsoft.com/office/drawing/2010/main" Requires="a14">
+      <mc:AlternateContent xmlns:mc="http://schemas.openxmlformats.org/markup-compatibility/2006" xmlns:a14="http://schemas.microsoft.com/office/drawing/2010/main">
+        <mc:Choice Requires="a14">
           <p:sp>
             <p:nvSpPr>
               <p:cNvPr id="12" name="Textfeld 11"/>
@@ -7276,7 +8249,7 @@
             </p:txBody>
           </p:sp>
         </mc:Choice>
-        <mc:Fallback>
+        <mc:Fallback xmlns="">
           <p:sp>
             <p:nvSpPr>
               <p:cNvPr id="12" name="Textfeld 11"/>
@@ -8525,7 +9498,7 @@
                 </a:ext>
               </a:extLst>
             </a:blip>
-            <a:srcRect l="-722" t="-961" r="722" b="961"/>
+            <a:srcRect l="-1445" t="-961" r="1445" b="961"/>
             <a:stretch/>
           </p:blipFill>
           <p:spPr bwMode="auto">
@@ -8806,15 +9779,7 @@
             </a:pPr>
             <a:r>
               <a:rPr lang="de-DE" dirty="0" smtClean="0"/>
-              <a:t>Mittels </a:t>
-            </a:r>
-            <a:r>
-              <a:rPr lang="de-DE" dirty="0" smtClean="0"/>
-              <a:t>Transformationsregeln aus </a:t>
-            </a:r>
-            <a:r>
-              <a:rPr lang="de-DE" dirty="0" smtClean="0"/>
-              <a:t>Annotationsgraph aufgebaut, ohne Wissen über Wortbedeutungen.</a:t>
+              <a:t>Mittels Transformationsregeln aus Annotationsgraph aufgebaut, ohne Wissen über Wortbedeutungen.</a:t>
             </a:r>
             <a:endParaRPr lang="de-DE" i="1" dirty="0"/>
           </a:p>
@@ -10303,11 +11268,7 @@
           <a:p>
             <a:r>
               <a:rPr lang="de-DE" sz="2400" b="1" dirty="0" smtClean="0"/>
-              <a:t>WG-Konstruktionsphase</a:t>
-            </a:r>
-            <a:r>
-              <a:rPr lang="de-DE" sz="2400" b="1" dirty="0" smtClean="0"/>
-              <a:t>:</a:t>
+              <a:t>WG-Konstruktionsphase:</a:t>
             </a:r>
             <a:r>
               <a:rPr lang="de-DE" sz="2400" dirty="0" smtClean="0"/>
@@ -10416,11 +11377,7 @@
           <a:p>
             <a:r>
               <a:rPr lang="de-DE" sz="2400" b="1" dirty="0" smtClean="0"/>
-              <a:t>WG-Konstruktionsphase</a:t>
-            </a:r>
-            <a:r>
-              <a:rPr lang="de-DE" sz="2400" b="1" dirty="0" smtClean="0"/>
-              <a:t>:</a:t>
+              <a:t>WG-Konstruktionsphase:</a:t>
             </a:r>
             <a:r>
               <a:rPr lang="de-DE" sz="2400" dirty="0" smtClean="0"/>
@@ -10656,11 +11613,7 @@
           <a:p>
             <a:r>
               <a:rPr lang="de-DE" sz="2400" b="1" dirty="0" smtClean="0"/>
-              <a:t>WG-Konstruktionsphase</a:t>
-            </a:r>
-            <a:r>
-              <a:rPr lang="de-DE" sz="2400" b="1" dirty="0" smtClean="0"/>
-              <a:t>:</a:t>
+              <a:t>WG-Konstruktionsphase:</a:t>
             </a:r>
             <a:r>
               <a:rPr lang="de-DE" sz="2400" dirty="0" smtClean="0"/>
@@ -10866,11 +11819,7 @@
           <a:p>
             <a:r>
               <a:rPr lang="de-DE" sz="2400" b="1" dirty="0" smtClean="0"/>
-              <a:t>WG-Konstruktionsphase</a:t>
-            </a:r>
-            <a:r>
-              <a:rPr lang="de-DE" sz="2400" b="1" dirty="0" smtClean="0"/>
-              <a:t>:</a:t>
+              <a:t>WG-Konstruktionsphase:</a:t>
             </a:r>
             <a:r>
               <a:rPr lang="de-DE" sz="2400" dirty="0" smtClean="0"/>
@@ -11056,11 +12005,7 @@
           <a:p>
             <a:r>
               <a:rPr lang="de-DE" sz="2400" b="1" dirty="0" smtClean="0"/>
-              <a:t>WG-Konstruktionsphase</a:t>
-            </a:r>
-            <a:r>
-              <a:rPr lang="de-DE" sz="2400" b="1" dirty="0" smtClean="0"/>
-              <a:t>:</a:t>
+              <a:t>WG-Konstruktionsphase:</a:t>
             </a:r>
             <a:r>
               <a:rPr lang="de-DE" sz="2400" dirty="0" smtClean="0"/>
@@ -11266,11 +12211,7 @@
           <a:p>
             <a:r>
               <a:rPr lang="de-DE" sz="2400" b="1" dirty="0" smtClean="0"/>
-              <a:t>WG-Konstruktionsphase</a:t>
-            </a:r>
-            <a:r>
-              <a:rPr lang="de-DE" sz="2400" b="1" dirty="0" smtClean="0"/>
-              <a:t>:</a:t>
+              <a:t>WG-Konstruktionsphase:</a:t>
             </a:r>
             <a:r>
               <a:rPr lang="de-DE" sz="2400" dirty="0" smtClean="0"/>
@@ -11735,11 +12676,7 @@
           <a:p>
             <a:r>
               <a:rPr lang="de-DE" sz="2400" b="1" dirty="0" smtClean="0"/>
-              <a:t>WG-Konstruktionsphase</a:t>
-            </a:r>
-            <a:r>
-              <a:rPr lang="de-DE" sz="2400" b="1" dirty="0" smtClean="0"/>
-              <a:t>:</a:t>
+              <a:t>WG-Konstruktionsphase:</a:t>
             </a:r>
             <a:r>
               <a:rPr lang="de-DE" sz="2400" dirty="0" smtClean="0"/>
@@ -11776,8 +12713,8 @@
           </a:p>
         </p:txBody>
       </p:sp>
-      <mc:AlternateContent xmlns:mc="http://schemas.openxmlformats.org/markup-compatibility/2006">
-        <mc:Choice xmlns:a14="http://schemas.microsoft.com/office/drawing/2010/main" Requires="a14">
+      <mc:AlternateContent xmlns:mc="http://schemas.openxmlformats.org/markup-compatibility/2006" xmlns:a14="http://schemas.microsoft.com/office/drawing/2010/main">
+        <mc:Choice Requires="a14">
           <p:sp>
             <p:nvSpPr>
               <p:cNvPr id="6" name="Inhaltsplatzhalter 1"/>
@@ -12336,7 +13273,7 @@
             </p:txBody>
           </p:sp>
         </mc:Choice>
-        <mc:Fallback>
+        <mc:Fallback xmlns="">
           <p:sp>
             <p:nvSpPr>
               <p:cNvPr id="6" name="Inhaltsplatzhalter 1"/>
@@ -12892,8 +13829,8 @@
           <a:chExt cx="0" cy="0"/>
         </a:xfrm>
       </p:grpSpPr>
-      <mc:AlternateContent xmlns:mc="http://schemas.openxmlformats.org/markup-compatibility/2006">
-        <mc:Choice xmlns:a14="http://schemas.microsoft.com/office/drawing/2010/main" Requires="a14">
+      <mc:AlternateContent xmlns:mc="http://schemas.openxmlformats.org/markup-compatibility/2006" xmlns:a14="http://schemas.microsoft.com/office/drawing/2010/main">
+        <mc:Choice Requires="a14">
           <p:sp>
             <p:nvSpPr>
               <p:cNvPr id="5" name="Inhaltsplatzhalter 4"/>
@@ -13240,16 +14177,7 @@
                                 <a:rPr lang="de-DE" sz="2400" b="0" i="0" smtClean="0">
                                   <a:latin typeface="Cambria Math"/>
                                 </a:rPr>
-                                <m:t>arg</m:t>
-                              </m:r>
-                              <m:r>
-                                <m:rPr>
-                                  <m:sty m:val="p"/>
-                                </m:rPr>
-                                <a:rPr lang="de-DE" sz="2400" b="0" i="0" smtClean="0">
-                                  <a:latin typeface="Cambria Math"/>
-                                </a:rPr>
-                                <m:t>max</m:t>
+                                <m:t>argmax</m:t>
                               </m:r>
                             </m:e>
                             <m:lim>
@@ -13316,7 +14244,7 @@
             </p:txBody>
           </p:sp>
         </mc:Choice>
-        <mc:Fallback>
+        <mc:Fallback xmlns="">
           <p:sp>
             <p:nvSpPr>
               <p:cNvPr id="5" name="Inhaltsplatzhalter 4"/>
@@ -13394,11 +14322,7 @@
           <a:p>
             <a:r>
               <a:rPr lang="de-DE" sz="2400" b="1" dirty="0" smtClean="0"/>
-              <a:t>WG-Konstruktionsphase</a:t>
-            </a:r>
-            <a:r>
-              <a:rPr lang="de-DE" sz="2400" b="1" dirty="0" smtClean="0"/>
-              <a:t>:</a:t>
+              <a:t>WG-Konstruktionsphase:</a:t>
             </a:r>
             <a:r>
               <a:rPr lang="de-DE" sz="2400" dirty="0" smtClean="0"/>
@@ -13421,9 +14345,9 @@
         <p:grpSpPr>
           <a:xfrm>
             <a:off x="263352" y="4509657"/>
-            <a:ext cx="7118085" cy="1457182"/>
+            <a:ext cx="7118085" cy="1377672"/>
             <a:chOff x="263352" y="4509657"/>
-            <a:chExt cx="7118085" cy="1457182"/>
+            <a:chExt cx="7118085" cy="1377672"/>
           </a:xfrm>
         </p:grpSpPr>
         <p:sp>
@@ -13480,7 +14404,7 @@
           </p:nvSpPr>
           <p:spPr>
             <a:xfrm>
-              <a:off x="263352" y="5301208"/>
+              <a:off x="263352" y="5221698"/>
               <a:ext cx="5184576" cy="665631"/>
             </a:xfrm>
             <a:prstGeom prst="rect">
@@ -13548,8 +14472,8 @@
         </p:nvSpPr>
         <p:spPr>
           <a:xfrm>
-            <a:off x="6384032" y="5301208"/>
-            <a:ext cx="5184576" cy="665631"/>
+            <a:off x="6384032" y="5221698"/>
+            <a:ext cx="5184576" cy="1200329"/>
           </a:xfrm>
           <a:prstGeom prst="rect">
             <a:avLst/>
@@ -13625,9 +14549,117 @@
                 <a:latin typeface="Roboto Light" panose="02000000000000000000" pitchFamily="2" charset="0"/>
                 <a:ea typeface="Roboto Light" panose="02000000000000000000" pitchFamily="2" charset="0"/>
               </a:rPr>
-              <a:t> ADMM</a:t>
-            </a:r>
-            <a:endParaRPr lang="en-US" sz="2400" dirty="0">
+              <a:t> </a:t>
+            </a:r>
+            <a:r>
+              <a:rPr lang="en-US" sz="2800" i="1" dirty="0" smtClean="0">
+                <a:solidFill>
+                  <a:schemeClr val="accent3"/>
+                </a:solidFill>
+                <a:latin typeface="Roboto Light" panose="02000000000000000000" pitchFamily="2" charset="0"/>
+                <a:ea typeface="Roboto Light" panose="02000000000000000000" pitchFamily="2" charset="0"/>
+              </a:rPr>
+              <a:t>ADMM</a:t>
+            </a:r>
+          </a:p>
+          <a:p>
+            <a:pPr marL="0" lvl="0" indent="0" algn="ctr">
+              <a:lnSpc>
+                <a:spcPct val="150000"/>
+              </a:lnSpc>
+              <a:buNone/>
+            </a:pPr>
+            <a:r>
+              <a:rPr lang="en-US" sz="2000" dirty="0" smtClean="0">
+                <a:solidFill>
+                  <a:schemeClr val="accent3"/>
+                </a:solidFill>
+                <a:latin typeface="Roboto Light" panose="02000000000000000000" pitchFamily="2" charset="0"/>
+                <a:ea typeface="Roboto Light" panose="02000000000000000000" pitchFamily="2" charset="0"/>
+              </a:rPr>
+              <a:t>(</a:t>
+            </a:r>
+            <a:r>
+              <a:rPr lang="en-US" sz="2000" b="1" dirty="0" smtClean="0">
+                <a:solidFill>
+                  <a:schemeClr val="accent3"/>
+                </a:solidFill>
+                <a:latin typeface="Roboto Light" panose="02000000000000000000" pitchFamily="2" charset="0"/>
+                <a:ea typeface="Roboto Light" panose="02000000000000000000" pitchFamily="2" charset="0"/>
+              </a:rPr>
+              <a:t>A</a:t>
+            </a:r>
+            <a:r>
+              <a:rPr lang="en-US" sz="2000" dirty="0" smtClean="0">
+                <a:solidFill>
+                  <a:schemeClr val="accent3"/>
+                </a:solidFill>
+                <a:latin typeface="Roboto Light" panose="02000000000000000000" pitchFamily="2" charset="0"/>
+                <a:ea typeface="Roboto Light" panose="02000000000000000000" pitchFamily="2" charset="0"/>
+              </a:rPr>
+              <a:t>lternating </a:t>
+            </a:r>
+            <a:r>
+              <a:rPr lang="en-US" sz="2000" b="1" dirty="0" smtClean="0">
+                <a:solidFill>
+                  <a:schemeClr val="accent3"/>
+                </a:solidFill>
+                <a:latin typeface="Roboto Light" panose="02000000000000000000" pitchFamily="2" charset="0"/>
+                <a:ea typeface="Roboto Light" panose="02000000000000000000" pitchFamily="2" charset="0"/>
+              </a:rPr>
+              <a:t>D</a:t>
+            </a:r>
+            <a:r>
+              <a:rPr lang="en-US" sz="2000" dirty="0" smtClean="0">
+                <a:solidFill>
+                  <a:schemeClr val="accent3"/>
+                </a:solidFill>
+                <a:latin typeface="Roboto Light" panose="02000000000000000000" pitchFamily="2" charset="0"/>
+                <a:ea typeface="Roboto Light" panose="02000000000000000000" pitchFamily="2" charset="0"/>
+              </a:rPr>
+              <a:t>irection </a:t>
+            </a:r>
+            <a:r>
+              <a:rPr lang="en-US" sz="2000" b="1" dirty="0" smtClean="0">
+                <a:solidFill>
+                  <a:schemeClr val="accent3"/>
+                </a:solidFill>
+                <a:latin typeface="Roboto Light" panose="02000000000000000000" pitchFamily="2" charset="0"/>
+                <a:ea typeface="Roboto Light" panose="02000000000000000000" pitchFamily="2" charset="0"/>
+              </a:rPr>
+              <a:t>M</a:t>
+            </a:r>
+            <a:r>
+              <a:rPr lang="en-US" sz="2000" dirty="0" smtClean="0">
+                <a:solidFill>
+                  <a:schemeClr val="accent3"/>
+                </a:solidFill>
+                <a:latin typeface="Roboto Light" panose="02000000000000000000" pitchFamily="2" charset="0"/>
+                <a:ea typeface="Roboto Light" panose="02000000000000000000" pitchFamily="2" charset="0"/>
+              </a:rPr>
+              <a:t>ethod of </a:t>
+            </a:r>
+            <a:r>
+              <a:rPr lang="en-US" sz="2000" b="1" dirty="0" smtClean="0">
+                <a:solidFill>
+                  <a:schemeClr val="accent3"/>
+                </a:solidFill>
+                <a:latin typeface="Roboto Light" panose="02000000000000000000" pitchFamily="2" charset="0"/>
+                <a:ea typeface="Roboto Light" panose="02000000000000000000" pitchFamily="2" charset="0"/>
+              </a:rPr>
+              <a:t>M</a:t>
+            </a:r>
+            <a:r>
+              <a:rPr lang="en-US" sz="2000" dirty="0" smtClean="0">
+                <a:solidFill>
+                  <a:schemeClr val="accent3"/>
+                </a:solidFill>
+                <a:latin typeface="Roboto Light" panose="02000000000000000000" pitchFamily="2" charset="0"/>
+                <a:ea typeface="Roboto Light" panose="02000000000000000000" pitchFamily="2" charset="0"/>
+              </a:rPr>
+              <a:t>ultipliers)</a:t>
+            </a:r>
+            <a:endParaRPr lang="en-US" sz="2000" dirty="0">
               <a:solidFill>
                 <a:schemeClr val="accent3"/>
               </a:solidFill>
@@ -13732,39 +14764,26 @@
                                   </p:childTnLst>
                                 </p:cTn>
                               </p:par>
+                            </p:childTnLst>
+                          </p:cTn>
+                        </p:par>
+                      </p:childTnLst>
+                    </p:cTn>
+                  </p:par>
+                  <p:par>
+                    <p:cTn id="9" fill="hold">
+                      <p:stCondLst>
+                        <p:cond delay="indefinite"/>
+                      </p:stCondLst>
+                      <p:childTnLst>
+                        <p:par>
+                          <p:cTn id="10" fill="hold">
+                            <p:stCondLst>
+                              <p:cond delay="0"/>
+                            </p:stCondLst>
+                            <p:childTnLst>
                               <p:par>
-                                <p:cTn id="9" presetID="1" presetClass="entr" presetSubtype="0" fill="hold" grpId="0" nodeType="withEffect">
-                                  <p:stCondLst>
-                                    <p:cond delay="0"/>
-                                  </p:stCondLst>
-                                  <p:childTnLst>
-                                    <p:set>
-                                      <p:cBhvr>
-                                        <p:cTn id="10" dur="1" fill="hold">
-                                          <p:stCondLst>
-                                            <p:cond delay="0"/>
-                                          </p:stCondLst>
-                                        </p:cTn>
-                                        <p:tgtEl>
-                                          <p:spTgt spid="5">
-                                            <p:txEl>
-                                              <p:pRg st="2" end="2"/>
-                                            </p:txEl>
-                                          </p:spTgt>
-                                        </p:tgtEl>
-                                        <p:attrNameLst>
-                                          <p:attrName>style.visibility</p:attrName>
-                                        </p:attrNameLst>
-                                      </p:cBhvr>
-                                      <p:to>
-                                        <p:strVal val="visible"/>
-                                      </p:to>
-                                    </p:set>
-                                  </p:childTnLst>
-                                </p:cTn>
-                              </p:par>
-                              <p:par>
-                                <p:cTn id="11" presetID="1" presetClass="entr" presetSubtype="0" fill="hold" grpId="0" nodeType="withEffect">
+                                <p:cTn id="11" presetID="1" presetClass="entr" presetSubtype="0" fill="hold" grpId="0" nodeType="clickEffect">
                                   <p:stCondLst>
                                     <p:cond delay="0"/>
                                   </p:stCondLst>
@@ -13779,7 +14798,7 @@
                                         <p:tgtEl>
                                           <p:spTgt spid="5">
                                             <p:txEl>
-                                              <p:pRg st="3" end="3"/>
+                                              <p:pRg st="2" end="2"/>
                                             </p:txEl>
                                           </p:spTgt>
                                         </p:tgtEl>
@@ -13813,7 +14832,7 @@
                             </p:stCondLst>
                             <p:childTnLst>
                               <p:par>
-                                <p:cTn id="15" presetID="1" presetClass="entr" presetSubtype="0" fill="hold" nodeType="clickEffect">
+                                <p:cTn id="15" presetID="1" presetClass="entr" presetSubtype="0" fill="hold" grpId="0" nodeType="clickEffect">
                                   <p:stCondLst>
                                     <p:cond delay="0"/>
                                   </p:stCondLst>
@@ -13826,7 +14845,11 @@
                                           </p:stCondLst>
                                         </p:cTn>
                                         <p:tgtEl>
-                                          <p:spTgt spid="16"/>
+                                          <p:spTgt spid="5">
+                                            <p:txEl>
+                                              <p:pRg st="3" end="3"/>
+                                            </p:txEl>
+                                          </p:spTgt>
                                         </p:tgtEl>
                                         <p:attrNameLst>
                                           <p:attrName>style.visibility</p:attrName>
@@ -13858,7 +14881,7 @@
                             </p:stCondLst>
                             <p:childTnLst>
                               <p:par>
-                                <p:cTn id="19" presetID="1" presetClass="entr" presetSubtype="0" fill="hold" grpId="0" nodeType="clickEffect">
+                                <p:cTn id="19" presetID="1" presetClass="entr" presetSubtype="0" fill="hold" nodeType="clickEffect">
                                   <p:stCondLst>
                                     <p:cond delay="0"/>
                                   </p:stCondLst>
@@ -13866,6 +14889,51 @@
                                     <p:set>
                                       <p:cBhvr>
                                         <p:cTn id="20" dur="1" fill="hold">
+                                          <p:stCondLst>
+                                            <p:cond delay="0"/>
+                                          </p:stCondLst>
+                                        </p:cTn>
+                                        <p:tgtEl>
+                                          <p:spTgt spid="16"/>
+                                        </p:tgtEl>
+                                        <p:attrNameLst>
+                                          <p:attrName>style.visibility</p:attrName>
+                                        </p:attrNameLst>
+                                      </p:cBhvr>
+                                      <p:to>
+                                        <p:strVal val="visible"/>
+                                      </p:to>
+                                    </p:set>
+                                  </p:childTnLst>
+                                </p:cTn>
+                              </p:par>
+                            </p:childTnLst>
+                          </p:cTn>
+                        </p:par>
+                      </p:childTnLst>
+                    </p:cTn>
+                  </p:par>
+                  <p:par>
+                    <p:cTn id="21" fill="hold">
+                      <p:stCondLst>
+                        <p:cond delay="indefinite"/>
+                      </p:stCondLst>
+                      <p:childTnLst>
+                        <p:par>
+                          <p:cTn id="22" fill="hold">
+                            <p:stCondLst>
+                              <p:cond delay="0"/>
+                            </p:stCondLst>
+                            <p:childTnLst>
+                              <p:par>
+                                <p:cTn id="23" presetID="1" presetClass="entr" presetSubtype="0" fill="hold" grpId="0" nodeType="clickEffect">
+                                  <p:stCondLst>
+                                    <p:cond delay="0"/>
+                                  </p:stCondLst>
+                                  <p:childTnLst>
+                                    <p:set>
+                                      <p:cBhvr>
+                                        <p:cTn id="24" dur="1" fill="hold">
                                           <p:stCondLst>
                                             <p:cond delay="0"/>
                                           </p:stCondLst>
@@ -14474,8 +15542,8 @@
           <a:chExt cx="0" cy="0"/>
         </a:xfrm>
       </p:grpSpPr>
-      <mc:AlternateContent xmlns:mc="http://schemas.openxmlformats.org/markup-compatibility/2006">
-        <mc:Choice xmlns:a14="http://schemas.microsoft.com/office/drawing/2010/main" Requires="a14">
+      <mc:AlternateContent xmlns:mc="http://schemas.openxmlformats.org/markup-compatibility/2006" xmlns:a14="http://schemas.microsoft.com/office/drawing/2010/main">
+        <mc:Choice Requires="a14">
           <p:sp>
             <p:nvSpPr>
               <p:cNvPr id="5" name="Inhaltsplatzhalter 4"/>
@@ -14854,7 +15922,7 @@
             </p:txBody>
           </p:sp>
         </mc:Choice>
-        <mc:Fallback>
+        <mc:Fallback xmlns="">
           <p:sp>
             <p:nvSpPr>
               <p:cNvPr id="5" name="Inhaltsplatzhalter 4"/>
@@ -14932,11 +16000,7 @@
           <a:p>
             <a:r>
               <a:rPr lang="de-DE" sz="2400" b="1" dirty="0" smtClean="0"/>
-              <a:t>WG-Konstruktionsphase</a:t>
-            </a:r>
-            <a:r>
-              <a:rPr lang="de-DE" sz="2400" b="1" dirty="0" smtClean="0"/>
-              <a:t>:</a:t>
+              <a:t>WG-Konstruktionsphase:</a:t>
             </a:r>
             <a:r>
               <a:rPr lang="de-DE" sz="2400" dirty="0" smtClean="0"/>
@@ -16973,7 +18037,7 @@
           <p:nvPr>
             <p:extLst>
               <p:ext uri="{D42A27DB-BD31-4B8C-83A1-F6EECF244321}">
-                <p14:modId xmlns:p14="http://schemas.microsoft.com/office/powerpoint/2010/main" val="3386619584"/>
+                <p14:modId xmlns:p14="http://schemas.microsoft.com/office/powerpoint/2010/main" val="4128423222"/>
               </p:ext>
             </p:extLst>
           </p:nvPr>
@@ -17170,7 +18234,7 @@
       </p:grpSpPr>
       <p:sp>
         <p:nvSpPr>
-          <p:cNvPr id="2" name="Titel 1"/>
+          <p:cNvPr id="3" name="Titel 2"/>
           <p:cNvSpPr>
             <a:spLocks noGrp="1"/>
           </p:cNvSpPr>
@@ -17178,24 +18242,22 @@
             <p:ph type="title"/>
           </p:nvPr>
         </p:nvSpPr>
-        <p:spPr>
-          <a:xfrm>
-            <a:off x="831851" y="1772817"/>
-            <a:ext cx="10515600" cy="3816424"/>
-          </a:xfrm>
-        </p:spPr>
+        <p:spPr/>
         <p:txBody>
-          <a:bodyPr anchor="ctr"/>
+          <a:bodyPr/>
           <a:lstStyle/>
           <a:p>
-            <a:pPr algn="ctr">
-              <a:lnSpc>
-                <a:spcPct val="150000"/>
-              </a:lnSpc>
-            </a:pPr>
-            <a:r>
-              <a:rPr lang="de-DE" smtClean="0"/>
-              <a:t>Danke!</a:t>
+            <a:r>
+              <a:rPr lang="de-DE" sz="2400" b="1" dirty="0" smtClean="0"/>
+              <a:t>Ausblick:</a:t>
+            </a:r>
+            <a:r>
+              <a:rPr lang="de-DE" sz="2400" dirty="0" smtClean="0"/>
+              <a:t>	</a:t>
+            </a:r>
+            <a:r>
+              <a:rPr lang="de-DE" dirty="0" smtClean="0"/>
+              <a:t>Testdaten</a:t>
             </a:r>
             <a:endParaRPr lang="de-DE" dirty="0"/>
           </a:p>
@@ -17203,7 +18265,7 @@
       </p:sp>
       <p:sp>
         <p:nvSpPr>
-          <p:cNvPr id="4" name="Foliennummernplatzhalter 3"/>
+          <p:cNvPr id="2" name="Foliennummernplatzhalter 1"/>
           <p:cNvSpPr>
             <a:spLocks noGrp="1"/>
           </p:cNvSpPr>
@@ -17226,54 +18288,267 @@
       </p:sp>
       <p:sp>
         <p:nvSpPr>
-          <p:cNvPr id="6" name="Rechteck 5"/>
-          <p:cNvSpPr/>
+          <p:cNvPr id="5" name="Inhaltsplatzhalter 4"/>
+          <p:cNvSpPr txBox="1">
+            <a:spLocks/>
+          </p:cNvSpPr>
           <p:nvPr/>
         </p:nvSpPr>
         <p:spPr>
           <a:xfrm>
-            <a:off x="9376564" y="1267862"/>
-            <a:ext cx="1904012" cy="1008112"/>
+            <a:off x="1703512" y="1124744"/>
+            <a:ext cx="8784976" cy="5052219"/>
           </a:xfrm>
           <a:prstGeom prst="rect">
             <a:avLst/>
           </a:prstGeom>
-          <a:solidFill>
-            <a:schemeClr val="bg1"/>
-          </a:solidFill>
-          <a:ln>
-            <a:noFill/>
-          </a:ln>
         </p:spPr>
-        <p:style>
-          <a:lnRef idx="2">
-            <a:schemeClr val="accent1">
-              <a:shade val="50000"/>
-            </a:schemeClr>
-          </a:lnRef>
-          <a:fillRef idx="1">
-            <a:schemeClr val="accent1"/>
-          </a:fillRef>
-          <a:effectRef idx="0">
-            <a:schemeClr val="accent1"/>
-          </a:effectRef>
-          <a:fontRef idx="minor">
-            <a:schemeClr val="lt1"/>
-          </a:fontRef>
-        </p:style>
         <p:txBody>
-          <a:bodyPr rtlCol="0" anchor="ctr"/>
-          <a:lstStyle/>
-          <a:p>
-            <a:pPr algn="ctr"/>
-            <a:endParaRPr lang="de-DE"/>
+          <a:bodyPr anchor="ctr">
+            <a:normAutofit/>
+          </a:bodyPr>
+          <a:lstStyle>
+            <a:lvl1pPr marL="228600" indent="-228600" algn="l" defTabSz="914400" rtl="0" eaLnBrk="1" latinLnBrk="0" hangingPunct="1">
+              <a:lnSpc>
+                <a:spcPct val="90000"/>
+              </a:lnSpc>
+              <a:spcBef>
+                <a:spcPts val="1000"/>
+              </a:spcBef>
+              <a:buFont typeface="Arial" panose="020B0604020202020204" pitchFamily="34" charset="0"/>
+              <a:buChar char="•"/>
+              <a:defRPr sz="2800" kern="1200">
+                <a:solidFill>
+                  <a:schemeClr val="tx1"/>
+                </a:solidFill>
+                <a:latin typeface="Roboto Light" panose="02000000000000000000" pitchFamily="2" charset="0"/>
+                <a:ea typeface="Roboto Light" panose="02000000000000000000" pitchFamily="2" charset="0"/>
+                <a:cs typeface="+mn-cs"/>
+              </a:defRPr>
+            </a:lvl1pPr>
+            <a:lvl2pPr marL="685800" indent="-228600" algn="l" defTabSz="914400" rtl="0" eaLnBrk="1" latinLnBrk="0" hangingPunct="1">
+              <a:lnSpc>
+                <a:spcPct val="90000"/>
+              </a:lnSpc>
+              <a:spcBef>
+                <a:spcPts val="500"/>
+              </a:spcBef>
+              <a:buFont typeface="Arial" panose="020B0604020202020204" pitchFamily="34" charset="0"/>
+              <a:buChar char="•"/>
+              <a:defRPr sz="2400" kern="1200">
+                <a:solidFill>
+                  <a:schemeClr val="tx1"/>
+                </a:solidFill>
+                <a:latin typeface="Roboto Light" panose="02000000000000000000" pitchFamily="2" charset="0"/>
+                <a:ea typeface="Roboto Light" panose="02000000000000000000" pitchFamily="2" charset="0"/>
+                <a:cs typeface="+mn-cs"/>
+              </a:defRPr>
+            </a:lvl2pPr>
+            <a:lvl3pPr marL="1143000" indent="-228600" algn="l" defTabSz="914400" rtl="0" eaLnBrk="1" latinLnBrk="0" hangingPunct="1">
+              <a:lnSpc>
+                <a:spcPct val="90000"/>
+              </a:lnSpc>
+              <a:spcBef>
+                <a:spcPts val="500"/>
+              </a:spcBef>
+              <a:buFont typeface="Arial" panose="020B0604020202020204" pitchFamily="34" charset="0"/>
+              <a:buChar char="•"/>
+              <a:defRPr sz="2000" kern="1200">
+                <a:solidFill>
+                  <a:schemeClr val="tx1"/>
+                </a:solidFill>
+                <a:latin typeface="Roboto Light" panose="02000000000000000000" pitchFamily="2" charset="0"/>
+                <a:ea typeface="Roboto Light" panose="02000000000000000000" pitchFamily="2" charset="0"/>
+                <a:cs typeface="+mn-cs"/>
+              </a:defRPr>
+            </a:lvl3pPr>
+            <a:lvl4pPr marL="1600200" indent="-228600" algn="l" defTabSz="914400" rtl="0" eaLnBrk="1" latinLnBrk="0" hangingPunct="1">
+              <a:lnSpc>
+                <a:spcPct val="90000"/>
+              </a:lnSpc>
+              <a:spcBef>
+                <a:spcPts val="500"/>
+              </a:spcBef>
+              <a:buFont typeface="Arial" panose="020B0604020202020204" pitchFamily="34" charset="0"/>
+              <a:buChar char="•"/>
+              <a:defRPr sz="1800" kern="1200">
+                <a:solidFill>
+                  <a:schemeClr val="tx1"/>
+                </a:solidFill>
+                <a:latin typeface="Roboto Light" panose="02000000000000000000" pitchFamily="2" charset="0"/>
+                <a:ea typeface="Roboto Light" panose="02000000000000000000" pitchFamily="2" charset="0"/>
+                <a:cs typeface="+mn-cs"/>
+              </a:defRPr>
+            </a:lvl4pPr>
+            <a:lvl5pPr marL="2057400" indent="-228600" algn="l" defTabSz="914400" rtl="0" eaLnBrk="1" latinLnBrk="0" hangingPunct="1">
+              <a:lnSpc>
+                <a:spcPct val="90000"/>
+              </a:lnSpc>
+              <a:spcBef>
+                <a:spcPts val="500"/>
+              </a:spcBef>
+              <a:buFont typeface="Arial" panose="020B0604020202020204" pitchFamily="34" charset="0"/>
+              <a:buChar char="•"/>
+              <a:defRPr sz="1800" kern="1200">
+                <a:solidFill>
+                  <a:schemeClr val="tx1"/>
+                </a:solidFill>
+                <a:latin typeface="Roboto Light" panose="02000000000000000000" pitchFamily="2" charset="0"/>
+                <a:ea typeface="Roboto Light" panose="02000000000000000000" pitchFamily="2" charset="0"/>
+                <a:cs typeface="+mn-cs"/>
+              </a:defRPr>
+            </a:lvl5pPr>
+            <a:lvl6pPr marL="2514600" indent="-228600" algn="l" defTabSz="914400" rtl="0" eaLnBrk="1" latinLnBrk="0" hangingPunct="1">
+              <a:lnSpc>
+                <a:spcPct val="90000"/>
+              </a:lnSpc>
+              <a:spcBef>
+                <a:spcPts val="500"/>
+              </a:spcBef>
+              <a:buFont typeface="Arial" panose="020B0604020202020204" pitchFamily="34" charset="0"/>
+              <a:buChar char="•"/>
+              <a:defRPr sz="1800" kern="1200">
+                <a:solidFill>
+                  <a:schemeClr val="tx1"/>
+                </a:solidFill>
+                <a:latin typeface="+mn-lt"/>
+                <a:ea typeface="+mn-ea"/>
+                <a:cs typeface="+mn-cs"/>
+              </a:defRPr>
+            </a:lvl6pPr>
+            <a:lvl7pPr marL="2971800" indent="-228600" algn="l" defTabSz="914400" rtl="0" eaLnBrk="1" latinLnBrk="0" hangingPunct="1">
+              <a:lnSpc>
+                <a:spcPct val="90000"/>
+              </a:lnSpc>
+              <a:spcBef>
+                <a:spcPts val="500"/>
+              </a:spcBef>
+              <a:buFont typeface="Arial" panose="020B0604020202020204" pitchFamily="34" charset="0"/>
+              <a:buChar char="•"/>
+              <a:defRPr sz="1800" kern="1200">
+                <a:solidFill>
+                  <a:schemeClr val="tx1"/>
+                </a:solidFill>
+                <a:latin typeface="+mn-lt"/>
+                <a:ea typeface="+mn-ea"/>
+                <a:cs typeface="+mn-cs"/>
+              </a:defRPr>
+            </a:lvl7pPr>
+            <a:lvl8pPr marL="3429000" indent="-228600" algn="l" defTabSz="914400" rtl="0" eaLnBrk="1" latinLnBrk="0" hangingPunct="1">
+              <a:lnSpc>
+                <a:spcPct val="90000"/>
+              </a:lnSpc>
+              <a:spcBef>
+                <a:spcPts val="500"/>
+              </a:spcBef>
+              <a:buFont typeface="Arial" panose="020B0604020202020204" pitchFamily="34" charset="0"/>
+              <a:buChar char="•"/>
+              <a:defRPr sz="1800" kern="1200">
+                <a:solidFill>
+                  <a:schemeClr val="tx1"/>
+                </a:solidFill>
+                <a:latin typeface="+mn-lt"/>
+                <a:ea typeface="+mn-ea"/>
+                <a:cs typeface="+mn-cs"/>
+              </a:defRPr>
+            </a:lvl8pPr>
+            <a:lvl9pPr marL="3886200" indent="-228600" algn="l" defTabSz="914400" rtl="0" eaLnBrk="1" latinLnBrk="0" hangingPunct="1">
+              <a:lnSpc>
+                <a:spcPct val="90000"/>
+              </a:lnSpc>
+              <a:spcBef>
+                <a:spcPts val="500"/>
+              </a:spcBef>
+              <a:buFont typeface="Arial" panose="020B0604020202020204" pitchFamily="34" charset="0"/>
+              <a:buChar char="•"/>
+              <a:defRPr sz="1800" kern="1200">
+                <a:solidFill>
+                  <a:schemeClr val="tx1"/>
+                </a:solidFill>
+                <a:latin typeface="+mn-lt"/>
+                <a:ea typeface="+mn-ea"/>
+                <a:cs typeface="+mn-cs"/>
+              </a:defRPr>
+            </a:lvl9pPr>
+          </a:lstStyle>
+          <a:p>
+            <a:pPr marL="0" indent="0" algn="ctr" fontAlgn="auto">
+              <a:lnSpc>
+                <a:spcPct val="200000"/>
+              </a:lnSpc>
+              <a:spcAft>
+                <a:spcPts val="0"/>
+              </a:spcAft>
+              <a:buFont typeface="Arial" panose="020B0604020202020204" pitchFamily="34" charset="0"/>
+              <a:buNone/>
+            </a:pPr>
+            <a:r>
+              <a:rPr lang="de-DE" sz="2400" dirty="0" smtClean="0"/>
+              <a:t>Entwickeln eines </a:t>
+            </a:r>
+            <a:r>
+              <a:rPr lang="de-DE" sz="2400" dirty="0" err="1" smtClean="0"/>
+              <a:t>Testsets</a:t>
+            </a:r>
+            <a:r>
+              <a:rPr lang="de-DE" sz="2400" dirty="0" smtClean="0"/>
+              <a:t> aus Kommunikationsdaten</a:t>
+            </a:r>
+          </a:p>
+          <a:p>
+            <a:pPr fontAlgn="auto">
+              <a:lnSpc>
+                <a:spcPct val="200000"/>
+              </a:lnSpc>
+              <a:spcAft>
+                <a:spcPts val="0"/>
+              </a:spcAft>
+              <a:buFont typeface="Wingdings" panose="05000000000000000000" pitchFamily="2" charset="2"/>
+              <a:buChar char="Ø"/>
+            </a:pPr>
+            <a:r>
+              <a:rPr lang="de-DE" sz="2400" dirty="0" smtClean="0"/>
+              <a:t>Lernen der Regelgewichte</a:t>
+            </a:r>
+          </a:p>
+          <a:p>
+            <a:pPr fontAlgn="auto">
+              <a:lnSpc>
+                <a:spcPct val="200000"/>
+              </a:lnSpc>
+              <a:spcAft>
+                <a:spcPts val="0"/>
+              </a:spcAft>
+              <a:buFont typeface="Wingdings" panose="05000000000000000000" pitchFamily="2" charset="2"/>
+              <a:buChar char="Ø"/>
+            </a:pPr>
+            <a:r>
+              <a:rPr lang="de-DE" sz="2400" dirty="0" smtClean="0"/>
+              <a:t>Empirischer Vergleich verschiedener PSL-Programme</a:t>
+            </a:r>
+          </a:p>
+          <a:p>
+            <a:pPr fontAlgn="auto">
+              <a:lnSpc>
+                <a:spcPct val="200000"/>
+              </a:lnSpc>
+              <a:spcAft>
+                <a:spcPts val="0"/>
+              </a:spcAft>
+              <a:buFont typeface="Wingdings" panose="05000000000000000000" pitchFamily="2" charset="2"/>
+              <a:buChar char="Ø"/>
+            </a:pPr>
+            <a:r>
+              <a:rPr lang="de-DE" sz="2400" dirty="0" smtClean="0"/>
+              <a:t>Vergleichbarkeit mit alternativen Verfahren</a:t>
+            </a:r>
           </a:p>
         </p:txBody>
       </p:sp>
     </p:spTree>
     <p:extLst>
       <p:ext uri="{BB962C8B-B14F-4D97-AF65-F5344CB8AC3E}">
-        <p14:creationId xmlns:p14="http://schemas.microsoft.com/office/powerpoint/2010/main" val="2382665206"/>
+        <p14:creationId xmlns:p14="http://schemas.microsoft.com/office/powerpoint/2010/main" val="1525470284"/>
       </p:ext>
     </p:extLst>
   </p:cSld>
@@ -17283,9 +18558,1709 @@
   <p:timing>
     <p:tnLst>
       <p:par>
-        <p:cTn id="1" dur="indefinite" restart="never" nodeType="tmRoot"/>
+        <p:cTn id="1" dur="indefinite" restart="never" nodeType="tmRoot">
+          <p:childTnLst>
+            <p:seq concurrent="1" nextAc="seek">
+              <p:cTn id="2" dur="indefinite" nodeType="mainSeq">
+                <p:childTnLst>
+                  <p:par>
+                    <p:cTn id="3" fill="hold">
+                      <p:stCondLst>
+                        <p:cond delay="indefinite"/>
+                        <p:cond evt="onBegin" delay="0">
+                          <p:tn val="2"/>
+                        </p:cond>
+                      </p:stCondLst>
+                      <p:childTnLst>
+                        <p:par>
+                          <p:cTn id="4" fill="hold">
+                            <p:stCondLst>
+                              <p:cond delay="0"/>
+                            </p:stCondLst>
+                            <p:childTnLst>
+                              <p:par>
+                                <p:cTn id="5" presetID="1" presetClass="entr" presetSubtype="0" fill="hold" grpId="0" nodeType="withEffect">
+                                  <p:stCondLst>
+                                    <p:cond delay="0"/>
+                                  </p:stCondLst>
+                                  <p:childTnLst>
+                                    <p:set>
+                                      <p:cBhvr>
+                                        <p:cTn id="6" dur="1" fill="hold">
+                                          <p:stCondLst>
+                                            <p:cond delay="0"/>
+                                          </p:stCondLst>
+                                        </p:cTn>
+                                        <p:tgtEl>
+                                          <p:spTgt spid="5">
+                                            <p:txEl>
+                                              <p:pRg st="0" end="0"/>
+                                            </p:txEl>
+                                          </p:spTgt>
+                                        </p:tgtEl>
+                                        <p:attrNameLst>
+                                          <p:attrName>style.visibility</p:attrName>
+                                        </p:attrNameLst>
+                                      </p:cBhvr>
+                                      <p:to>
+                                        <p:strVal val="visible"/>
+                                      </p:to>
+                                    </p:set>
+                                  </p:childTnLst>
+                                </p:cTn>
+                              </p:par>
+                            </p:childTnLst>
+                          </p:cTn>
+                        </p:par>
+                      </p:childTnLst>
+                    </p:cTn>
+                  </p:par>
+                  <p:par>
+                    <p:cTn id="7" fill="hold">
+                      <p:stCondLst>
+                        <p:cond delay="indefinite"/>
+                      </p:stCondLst>
+                      <p:childTnLst>
+                        <p:par>
+                          <p:cTn id="8" fill="hold">
+                            <p:stCondLst>
+                              <p:cond delay="0"/>
+                            </p:stCondLst>
+                            <p:childTnLst>
+                              <p:par>
+                                <p:cTn id="9" presetID="1" presetClass="entr" presetSubtype="0" fill="hold" grpId="0" nodeType="clickEffect">
+                                  <p:stCondLst>
+                                    <p:cond delay="0"/>
+                                  </p:stCondLst>
+                                  <p:childTnLst>
+                                    <p:set>
+                                      <p:cBhvr>
+                                        <p:cTn id="10" dur="1" fill="hold">
+                                          <p:stCondLst>
+                                            <p:cond delay="0"/>
+                                          </p:stCondLst>
+                                        </p:cTn>
+                                        <p:tgtEl>
+                                          <p:spTgt spid="5">
+                                            <p:txEl>
+                                              <p:pRg st="1" end="1"/>
+                                            </p:txEl>
+                                          </p:spTgt>
+                                        </p:tgtEl>
+                                        <p:attrNameLst>
+                                          <p:attrName>style.visibility</p:attrName>
+                                        </p:attrNameLst>
+                                      </p:cBhvr>
+                                      <p:to>
+                                        <p:strVal val="visible"/>
+                                      </p:to>
+                                    </p:set>
+                                  </p:childTnLst>
+                                </p:cTn>
+                              </p:par>
+                              <p:par>
+                                <p:cTn id="11" presetID="1" presetClass="entr" presetSubtype="0" fill="hold" grpId="0" nodeType="withEffect">
+                                  <p:stCondLst>
+                                    <p:cond delay="0"/>
+                                  </p:stCondLst>
+                                  <p:childTnLst>
+                                    <p:set>
+                                      <p:cBhvr>
+                                        <p:cTn id="12" dur="1" fill="hold">
+                                          <p:stCondLst>
+                                            <p:cond delay="0"/>
+                                          </p:stCondLst>
+                                        </p:cTn>
+                                        <p:tgtEl>
+                                          <p:spTgt spid="5">
+                                            <p:txEl>
+                                              <p:pRg st="2" end="2"/>
+                                            </p:txEl>
+                                          </p:spTgt>
+                                        </p:tgtEl>
+                                        <p:attrNameLst>
+                                          <p:attrName>style.visibility</p:attrName>
+                                        </p:attrNameLst>
+                                      </p:cBhvr>
+                                      <p:to>
+                                        <p:strVal val="visible"/>
+                                      </p:to>
+                                    </p:set>
+                                  </p:childTnLst>
+                                </p:cTn>
+                              </p:par>
+                              <p:par>
+                                <p:cTn id="13" presetID="1" presetClass="entr" presetSubtype="0" fill="hold" grpId="0" nodeType="withEffect">
+                                  <p:stCondLst>
+                                    <p:cond delay="0"/>
+                                  </p:stCondLst>
+                                  <p:childTnLst>
+                                    <p:set>
+                                      <p:cBhvr>
+                                        <p:cTn id="14" dur="1" fill="hold">
+                                          <p:stCondLst>
+                                            <p:cond delay="0"/>
+                                          </p:stCondLst>
+                                        </p:cTn>
+                                        <p:tgtEl>
+                                          <p:spTgt spid="5">
+                                            <p:txEl>
+                                              <p:pRg st="3" end="3"/>
+                                            </p:txEl>
+                                          </p:spTgt>
+                                        </p:tgtEl>
+                                        <p:attrNameLst>
+                                          <p:attrName>style.visibility</p:attrName>
+                                        </p:attrNameLst>
+                                      </p:cBhvr>
+                                      <p:to>
+                                        <p:strVal val="visible"/>
+                                      </p:to>
+                                    </p:set>
+                                  </p:childTnLst>
+                                </p:cTn>
+                              </p:par>
+                            </p:childTnLst>
+                          </p:cTn>
+                        </p:par>
+                      </p:childTnLst>
+                    </p:cTn>
+                  </p:par>
+                </p:childTnLst>
+              </p:cTn>
+              <p:prevCondLst>
+                <p:cond evt="onPrev" delay="0">
+                  <p:tgtEl>
+                    <p:sldTgt/>
+                  </p:tgtEl>
+                </p:cond>
+              </p:prevCondLst>
+              <p:nextCondLst>
+                <p:cond evt="onNext" delay="0">
+                  <p:tgtEl>
+                    <p:sldTgt/>
+                  </p:tgtEl>
+                </p:cond>
+              </p:nextCondLst>
+            </p:seq>
+          </p:childTnLst>
+        </p:cTn>
       </p:par>
     </p:tnLst>
+    <p:bldLst>
+      <p:bldP spid="5" grpId="0" uiExpand="1" build="p"/>
+    </p:bldLst>
+  </p:timing>
+</p:sld>
+</file>
+
+<file path=ppt/slides/slide38.xml><?xml version="1.0" encoding="utf-8"?>
+<p:sld xmlns:a="http://schemas.openxmlformats.org/drawingml/2006/main" xmlns:r="http://schemas.openxmlformats.org/officeDocument/2006/relationships" xmlns:p="http://schemas.openxmlformats.org/presentationml/2006/main">
+  <p:cSld>
+    <p:spTree>
+      <p:nvGrpSpPr>
+        <p:cNvPr id="1" name=""/>
+        <p:cNvGrpSpPr/>
+        <p:nvPr/>
+      </p:nvGrpSpPr>
+      <p:grpSpPr>
+        <a:xfrm>
+          <a:off x="0" y="0"/>
+          <a:ext cx="0" cy="0"/>
+          <a:chOff x="0" y="0"/>
+          <a:chExt cx="0" cy="0"/>
+        </a:xfrm>
+      </p:grpSpPr>
+      <p:sp>
+        <p:nvSpPr>
+          <p:cNvPr id="3" name="Titel 2"/>
+          <p:cNvSpPr>
+            <a:spLocks noGrp="1"/>
+          </p:cNvSpPr>
+          <p:nvPr>
+            <p:ph type="title"/>
+          </p:nvPr>
+        </p:nvSpPr>
+        <p:spPr/>
+        <p:txBody>
+          <a:bodyPr/>
+          <a:lstStyle/>
+          <a:p>
+            <a:r>
+              <a:rPr lang="de-DE" sz="2400" b="1" dirty="0" smtClean="0"/>
+              <a:t>Ausblick:</a:t>
+            </a:r>
+            <a:r>
+              <a:rPr lang="de-DE" sz="2400" dirty="0" smtClean="0"/>
+              <a:t>	</a:t>
+            </a:r>
+            <a:r>
+              <a:rPr lang="de-DE" dirty="0" smtClean="0"/>
+              <a:t>NLP- &amp; PSL-Phase</a:t>
+            </a:r>
+            <a:endParaRPr lang="de-DE" dirty="0"/>
+          </a:p>
+        </p:txBody>
+      </p:sp>
+      <p:sp>
+        <p:nvSpPr>
+          <p:cNvPr id="2" name="Foliennummernplatzhalter 1"/>
+          <p:cNvSpPr>
+            <a:spLocks noGrp="1"/>
+          </p:cNvSpPr>
+          <p:nvPr>
+            <p:ph type="sldNum" sz="quarter" idx="12"/>
+          </p:nvPr>
+        </p:nvSpPr>
+        <p:spPr/>
+        <p:txBody>
+          <a:bodyPr/>
+          <a:lstStyle/>
+          <a:p>
+            <a:fld id="{F4DAF760-8A09-427D-9634-9AF01F07ABD5}" type="slidenum">
+              <a:rPr lang="de-DE" smtClean="0"/>
+              <a:t>38</a:t>
+            </a:fld>
+            <a:endParaRPr lang="de-DE" dirty="0"/>
+          </a:p>
+        </p:txBody>
+      </p:sp>
+      <mc:AlternateContent xmlns:mc="http://schemas.openxmlformats.org/markup-compatibility/2006">
+        <mc:Choice xmlns:a14="http://schemas.microsoft.com/office/drawing/2010/main" Requires="a14">
+          <p:sp>
+            <p:nvSpPr>
+              <p:cNvPr id="5" name="Inhaltsplatzhalter 4"/>
+              <p:cNvSpPr txBox="1">
+                <a:spLocks/>
+              </p:cNvSpPr>
+              <p:nvPr/>
+            </p:nvSpPr>
+            <p:spPr>
+              <a:xfrm>
+                <a:off x="911424" y="1124744"/>
+                <a:ext cx="10369152" cy="5052219"/>
+              </a:xfrm>
+              <a:prstGeom prst="rect">
+                <a:avLst/>
+              </a:prstGeom>
+            </p:spPr>
+            <p:txBody>
+              <a:bodyPr anchor="ctr">
+                <a:normAutofit/>
+              </a:bodyPr>
+              <a:lstStyle>
+                <a:lvl1pPr marL="228600" indent="-228600" algn="l" defTabSz="914400" rtl="0" eaLnBrk="1" latinLnBrk="0" hangingPunct="1">
+                  <a:lnSpc>
+                    <a:spcPct val="90000"/>
+                  </a:lnSpc>
+                  <a:spcBef>
+                    <a:spcPts val="1000"/>
+                  </a:spcBef>
+                  <a:buFont typeface="Arial" panose="020B0604020202020204" pitchFamily="34" charset="0"/>
+                  <a:buChar char="•"/>
+                  <a:defRPr sz="2800" kern="1200">
+                    <a:solidFill>
+                      <a:schemeClr val="tx1"/>
+                    </a:solidFill>
+                    <a:latin typeface="Roboto Light" panose="02000000000000000000" pitchFamily="2" charset="0"/>
+                    <a:ea typeface="Roboto Light" panose="02000000000000000000" pitchFamily="2" charset="0"/>
+                    <a:cs typeface="+mn-cs"/>
+                  </a:defRPr>
+                </a:lvl1pPr>
+                <a:lvl2pPr marL="685800" indent="-228600" algn="l" defTabSz="914400" rtl="0" eaLnBrk="1" latinLnBrk="0" hangingPunct="1">
+                  <a:lnSpc>
+                    <a:spcPct val="90000"/>
+                  </a:lnSpc>
+                  <a:spcBef>
+                    <a:spcPts val="500"/>
+                  </a:spcBef>
+                  <a:buFont typeface="Arial" panose="020B0604020202020204" pitchFamily="34" charset="0"/>
+                  <a:buChar char="•"/>
+                  <a:defRPr sz="2400" kern="1200">
+                    <a:solidFill>
+                      <a:schemeClr val="tx1"/>
+                    </a:solidFill>
+                    <a:latin typeface="Roboto Light" panose="02000000000000000000" pitchFamily="2" charset="0"/>
+                    <a:ea typeface="Roboto Light" panose="02000000000000000000" pitchFamily="2" charset="0"/>
+                    <a:cs typeface="+mn-cs"/>
+                  </a:defRPr>
+                </a:lvl2pPr>
+                <a:lvl3pPr marL="1143000" indent="-228600" algn="l" defTabSz="914400" rtl="0" eaLnBrk="1" latinLnBrk="0" hangingPunct="1">
+                  <a:lnSpc>
+                    <a:spcPct val="90000"/>
+                  </a:lnSpc>
+                  <a:spcBef>
+                    <a:spcPts val="500"/>
+                  </a:spcBef>
+                  <a:buFont typeface="Arial" panose="020B0604020202020204" pitchFamily="34" charset="0"/>
+                  <a:buChar char="•"/>
+                  <a:defRPr sz="2000" kern="1200">
+                    <a:solidFill>
+                      <a:schemeClr val="tx1"/>
+                    </a:solidFill>
+                    <a:latin typeface="Roboto Light" panose="02000000000000000000" pitchFamily="2" charset="0"/>
+                    <a:ea typeface="Roboto Light" panose="02000000000000000000" pitchFamily="2" charset="0"/>
+                    <a:cs typeface="+mn-cs"/>
+                  </a:defRPr>
+                </a:lvl3pPr>
+                <a:lvl4pPr marL="1600200" indent="-228600" algn="l" defTabSz="914400" rtl="0" eaLnBrk="1" latinLnBrk="0" hangingPunct="1">
+                  <a:lnSpc>
+                    <a:spcPct val="90000"/>
+                  </a:lnSpc>
+                  <a:spcBef>
+                    <a:spcPts val="500"/>
+                  </a:spcBef>
+                  <a:buFont typeface="Arial" panose="020B0604020202020204" pitchFamily="34" charset="0"/>
+                  <a:buChar char="•"/>
+                  <a:defRPr sz="1800" kern="1200">
+                    <a:solidFill>
+                      <a:schemeClr val="tx1"/>
+                    </a:solidFill>
+                    <a:latin typeface="Roboto Light" panose="02000000000000000000" pitchFamily="2" charset="0"/>
+                    <a:ea typeface="Roboto Light" panose="02000000000000000000" pitchFamily="2" charset="0"/>
+                    <a:cs typeface="+mn-cs"/>
+                  </a:defRPr>
+                </a:lvl4pPr>
+                <a:lvl5pPr marL="2057400" indent="-228600" algn="l" defTabSz="914400" rtl="0" eaLnBrk="1" latinLnBrk="0" hangingPunct="1">
+                  <a:lnSpc>
+                    <a:spcPct val="90000"/>
+                  </a:lnSpc>
+                  <a:spcBef>
+                    <a:spcPts val="500"/>
+                  </a:spcBef>
+                  <a:buFont typeface="Arial" panose="020B0604020202020204" pitchFamily="34" charset="0"/>
+                  <a:buChar char="•"/>
+                  <a:defRPr sz="1800" kern="1200">
+                    <a:solidFill>
+                      <a:schemeClr val="tx1"/>
+                    </a:solidFill>
+                    <a:latin typeface="Roboto Light" panose="02000000000000000000" pitchFamily="2" charset="0"/>
+                    <a:ea typeface="Roboto Light" panose="02000000000000000000" pitchFamily="2" charset="0"/>
+                    <a:cs typeface="+mn-cs"/>
+                  </a:defRPr>
+                </a:lvl5pPr>
+                <a:lvl6pPr marL="2514600" indent="-228600" algn="l" defTabSz="914400" rtl="0" eaLnBrk="1" latinLnBrk="0" hangingPunct="1">
+                  <a:lnSpc>
+                    <a:spcPct val="90000"/>
+                  </a:lnSpc>
+                  <a:spcBef>
+                    <a:spcPts val="500"/>
+                  </a:spcBef>
+                  <a:buFont typeface="Arial" panose="020B0604020202020204" pitchFamily="34" charset="0"/>
+                  <a:buChar char="•"/>
+                  <a:defRPr sz="1800" kern="1200">
+                    <a:solidFill>
+                      <a:schemeClr val="tx1"/>
+                    </a:solidFill>
+                    <a:latin typeface="+mn-lt"/>
+                    <a:ea typeface="+mn-ea"/>
+                    <a:cs typeface="+mn-cs"/>
+                  </a:defRPr>
+                </a:lvl6pPr>
+                <a:lvl7pPr marL="2971800" indent="-228600" algn="l" defTabSz="914400" rtl="0" eaLnBrk="1" latinLnBrk="0" hangingPunct="1">
+                  <a:lnSpc>
+                    <a:spcPct val="90000"/>
+                  </a:lnSpc>
+                  <a:spcBef>
+                    <a:spcPts val="500"/>
+                  </a:spcBef>
+                  <a:buFont typeface="Arial" panose="020B0604020202020204" pitchFamily="34" charset="0"/>
+                  <a:buChar char="•"/>
+                  <a:defRPr sz="1800" kern="1200">
+                    <a:solidFill>
+                      <a:schemeClr val="tx1"/>
+                    </a:solidFill>
+                    <a:latin typeface="+mn-lt"/>
+                    <a:ea typeface="+mn-ea"/>
+                    <a:cs typeface="+mn-cs"/>
+                  </a:defRPr>
+                </a:lvl7pPr>
+                <a:lvl8pPr marL="3429000" indent="-228600" algn="l" defTabSz="914400" rtl="0" eaLnBrk="1" latinLnBrk="0" hangingPunct="1">
+                  <a:lnSpc>
+                    <a:spcPct val="90000"/>
+                  </a:lnSpc>
+                  <a:spcBef>
+                    <a:spcPts val="500"/>
+                  </a:spcBef>
+                  <a:buFont typeface="Arial" panose="020B0604020202020204" pitchFamily="34" charset="0"/>
+                  <a:buChar char="•"/>
+                  <a:defRPr sz="1800" kern="1200">
+                    <a:solidFill>
+                      <a:schemeClr val="tx1"/>
+                    </a:solidFill>
+                    <a:latin typeface="+mn-lt"/>
+                    <a:ea typeface="+mn-ea"/>
+                    <a:cs typeface="+mn-cs"/>
+                  </a:defRPr>
+                </a:lvl8pPr>
+                <a:lvl9pPr marL="3886200" indent="-228600" algn="l" defTabSz="914400" rtl="0" eaLnBrk="1" latinLnBrk="0" hangingPunct="1">
+                  <a:lnSpc>
+                    <a:spcPct val="90000"/>
+                  </a:lnSpc>
+                  <a:spcBef>
+                    <a:spcPts val="500"/>
+                  </a:spcBef>
+                  <a:buFont typeface="Arial" panose="020B0604020202020204" pitchFamily="34" charset="0"/>
+                  <a:buChar char="•"/>
+                  <a:defRPr sz="1800" kern="1200">
+                    <a:solidFill>
+                      <a:schemeClr val="tx1"/>
+                    </a:solidFill>
+                    <a:latin typeface="+mn-lt"/>
+                    <a:ea typeface="+mn-ea"/>
+                    <a:cs typeface="+mn-cs"/>
+                  </a:defRPr>
+                </a:lvl9pPr>
+              </a:lstStyle>
+              <a:p>
+                <a:pPr fontAlgn="auto">
+                  <a:lnSpc>
+                    <a:spcPct val="200000"/>
+                  </a:lnSpc>
+                  <a:spcAft>
+                    <a:spcPts val="0"/>
+                  </a:spcAft>
+                </a:pPr>
+                <a:r>
+                  <a:rPr lang="de-DE" sz="2400" dirty="0" smtClean="0"/>
+                  <a:t>Nicht alle </a:t>
+                </a:r>
+                <a:r>
+                  <a:rPr lang="de-DE" sz="2400" dirty="0" err="1" smtClean="0"/>
+                  <a:t>CoreNLP</a:t>
+                </a:r>
+                <a:r>
+                  <a:rPr lang="de-DE" sz="2400" dirty="0" smtClean="0"/>
+                  <a:t>-Annotationen werden bislang genutzt</a:t>
+                </a:r>
+              </a:p>
+              <a:p>
+                <a:pPr lvl="1" fontAlgn="auto">
+                  <a:lnSpc>
+                    <a:spcPct val="200000"/>
+                  </a:lnSpc>
+                  <a:spcAft>
+                    <a:spcPts val="0"/>
+                  </a:spcAft>
+                  <a:buFont typeface="Wingdings" panose="05000000000000000000" pitchFamily="2" charset="2"/>
+                  <a:buChar char="Ø"/>
+                </a:pPr>
+                <a:r>
+                  <a:rPr lang="de-DE" sz="2000" dirty="0" smtClean="0"/>
+                  <a:t>z. B. Integration des Natural </a:t>
+                </a:r>
+                <a:r>
+                  <a:rPr lang="de-DE" sz="2000" dirty="0" err="1" smtClean="0"/>
+                  <a:t>Logic</a:t>
+                </a:r>
+                <a:r>
+                  <a:rPr lang="de-DE" sz="2000" dirty="0" smtClean="0"/>
+                  <a:t> </a:t>
+                </a:r>
+                <a:r>
+                  <a:rPr lang="de-DE" sz="2000" dirty="0" err="1" smtClean="0"/>
+                  <a:t>Annotators</a:t>
+                </a:r>
+                <a:endParaRPr lang="de-DE" sz="2000" dirty="0" smtClean="0"/>
+              </a:p>
+              <a:p>
+                <a:pPr fontAlgn="auto">
+                  <a:lnSpc>
+                    <a:spcPct val="200000"/>
+                  </a:lnSpc>
+                  <a:spcAft>
+                    <a:spcPts val="0"/>
+                  </a:spcAft>
+                </a:pPr>
+                <a:r>
+                  <a:rPr lang="de-DE" sz="2400" dirty="0" smtClean="0"/>
+                  <a:t>Bislang sehr rudimentäres, exemplarisches PSL-Programm</a:t>
+                </a:r>
+              </a:p>
+              <a:p>
+                <a:pPr lvl="1" fontAlgn="auto">
+                  <a:lnSpc>
+                    <a:spcPct val="200000"/>
+                  </a:lnSpc>
+                  <a:spcAft>
+                    <a:spcPts val="0"/>
+                  </a:spcAft>
+                  <a:buFont typeface="Wingdings" panose="05000000000000000000" pitchFamily="2" charset="2"/>
+                  <a:buChar char="Ø"/>
+                </a:pPr>
+                <a:r>
+                  <a:rPr lang="de-DE" sz="2000" dirty="0" smtClean="0"/>
+                  <a:t>Stärkere Nutzung der Kontextinformationen, z. B. Inferenz von </a:t>
+                </a:r>
+                <a14:m>
+                  <m:oMath xmlns:m="http://schemas.openxmlformats.org/officeDocument/2006/math">
+                    <m:r>
+                      <a:rPr lang="de-DE" sz="2000" b="0" i="1" smtClean="0">
+                        <a:latin typeface="Cambria Math"/>
+                      </a:rPr>
+                      <m:t>𝑎𝑐𝑡𝑢𝑎𝑙</m:t>
+                    </m:r>
+                  </m:oMath>
+                </a14:m>
+                <a:endParaRPr lang="de-DE" sz="2000" dirty="0" smtClean="0"/>
+              </a:p>
+              <a:p>
+                <a:pPr fontAlgn="auto">
+                  <a:lnSpc>
+                    <a:spcPct val="200000"/>
+                  </a:lnSpc>
+                  <a:spcAft>
+                    <a:spcPts val="0"/>
+                  </a:spcAft>
+                </a:pPr>
+                <a:r>
+                  <a:rPr lang="de-DE" sz="2400" dirty="0" smtClean="0"/>
+                  <a:t>Kaum domänenspezifisches Vorwissen</a:t>
+                </a:r>
+              </a:p>
+              <a:p>
+                <a:pPr lvl="1" fontAlgn="auto">
+                  <a:lnSpc>
+                    <a:spcPct val="200000"/>
+                  </a:lnSpc>
+                  <a:spcAft>
+                    <a:spcPts val="0"/>
+                  </a:spcAft>
+                  <a:buFont typeface="Wingdings" panose="05000000000000000000" pitchFamily="2" charset="2"/>
+                  <a:buChar char="Ø"/>
+                </a:pPr>
+                <a:r>
+                  <a:rPr lang="de-DE" sz="2000" dirty="0" smtClean="0"/>
+                  <a:t>Integration vorhandener Wissensbasen, z. B. </a:t>
+                </a:r>
+                <a:r>
+                  <a:rPr lang="de-DE" sz="2000" i="1" dirty="0" smtClean="0"/>
+                  <a:t>NELL</a:t>
+                </a:r>
+                <a:r>
+                  <a:rPr lang="de-DE" sz="2000" dirty="0"/>
+                  <a:t> </a:t>
+                </a:r>
+                <a:r>
+                  <a:rPr lang="de-DE" sz="2000" dirty="0" smtClean="0"/>
+                  <a:t>oder </a:t>
+                </a:r>
+                <a:r>
+                  <a:rPr lang="de-DE" sz="2000" i="1" dirty="0" smtClean="0"/>
+                  <a:t>YAGO</a:t>
+                </a:r>
+              </a:p>
+            </p:txBody>
+          </p:sp>
+        </mc:Choice>
+        <mc:Fallback>
+          <p:sp>
+            <p:nvSpPr>
+              <p:cNvPr id="5" name="Inhaltsplatzhalter 4"/>
+              <p:cNvSpPr txBox="1">
+                <a:spLocks noRot="1" noChangeAspect="1" noMove="1" noResize="1" noEditPoints="1" noAdjustHandles="1" noChangeArrowheads="1" noChangeShapeType="1" noTextEdit="1"/>
+              </p:cNvSpPr>
+              <p:nvPr/>
+            </p:nvSpPr>
+            <p:spPr>
+              <a:xfrm>
+                <a:off x="911424" y="1124744"/>
+                <a:ext cx="10369152" cy="5052219"/>
+              </a:xfrm>
+              <a:prstGeom prst="rect">
+                <a:avLst/>
+              </a:prstGeom>
+              <a:blipFill rotWithShape="1">
+                <a:blip r:embed="rId2"/>
+                <a:stretch>
+                  <a:fillRect l="-824"/>
+                </a:stretch>
+              </a:blipFill>
+            </p:spPr>
+            <p:txBody>
+              <a:bodyPr/>
+              <a:lstStyle/>
+              <a:p>
+                <a:r>
+                  <a:rPr lang="de-DE">
+                    <a:noFill/>
+                  </a:rPr>
+                  <a:t> </a:t>
+                </a:r>
+              </a:p>
+            </p:txBody>
+          </p:sp>
+        </mc:Fallback>
+      </mc:AlternateContent>
+      <p:pic>
+        <p:nvPicPr>
+          <p:cNvPr id="1026" name="Picture 2" descr="C:\Users\a587002\Documents\bachelor-thesis\presentation\initialGraph.emf"/>
+          <p:cNvPicPr>
+            <a:picLocks noChangeAspect="1" noChangeArrowheads="1"/>
+          </p:cNvPicPr>
+          <p:nvPr/>
+        </p:nvPicPr>
+        <p:blipFill>
+          <a:blip r:embed="rId3" cstate="print">
+            <a:extLst>
+              <a:ext uri="{28A0092B-C50C-407E-A947-70E740481C1C}">
+                <a14:useLocalDpi xmlns:a14="http://schemas.microsoft.com/office/drawing/2010/main" val="0"/>
+              </a:ext>
+            </a:extLst>
+          </a:blip>
+          <a:srcRect/>
+          <a:stretch>
+            <a:fillRect/>
+          </a:stretch>
+        </p:blipFill>
+        <p:spPr bwMode="auto">
+          <a:xfrm>
+            <a:off x="6744072" y="4437112"/>
+            <a:ext cx="5256163" cy="996353"/>
+          </a:xfrm>
+          <a:prstGeom prst="rect">
+            <a:avLst/>
+          </a:prstGeom>
+          <a:noFill/>
+          <a:extLst>
+            <a:ext uri="{909E8E84-426E-40DD-AFC4-6F175D3DCCD1}">
+              <a14:hiddenFill xmlns:a14="http://schemas.microsoft.com/office/drawing/2010/main">
+                <a:solidFill>
+                  <a:srgbClr val="FFFFFF"/>
+                </a:solidFill>
+              </a14:hiddenFill>
+            </a:ext>
+          </a:extLst>
+        </p:spPr>
+      </p:pic>
+    </p:spTree>
+    <p:extLst>
+      <p:ext uri="{BB962C8B-B14F-4D97-AF65-F5344CB8AC3E}">
+        <p14:creationId xmlns:p14="http://schemas.microsoft.com/office/powerpoint/2010/main" val="3811464052"/>
+      </p:ext>
+    </p:extLst>
+  </p:cSld>
+  <p:clrMapOvr>
+    <a:masterClrMapping/>
+  </p:clrMapOvr>
+  <p:timing>
+    <p:tnLst>
+      <p:par>
+        <p:cTn id="1" dur="indefinite" restart="never" nodeType="tmRoot">
+          <p:childTnLst>
+            <p:seq concurrent="1" nextAc="seek">
+              <p:cTn id="2" dur="indefinite" nodeType="mainSeq">
+                <p:childTnLst>
+                  <p:par>
+                    <p:cTn id="3" fill="hold">
+                      <p:stCondLst>
+                        <p:cond delay="indefinite"/>
+                      </p:stCondLst>
+                      <p:childTnLst>
+                        <p:par>
+                          <p:cTn id="4" fill="hold">
+                            <p:stCondLst>
+                              <p:cond delay="0"/>
+                            </p:stCondLst>
+                            <p:childTnLst>
+                              <p:par>
+                                <p:cTn id="5" presetID="1" presetClass="entr" presetSubtype="0" fill="hold" grpId="0" nodeType="clickEffect">
+                                  <p:stCondLst>
+                                    <p:cond delay="0"/>
+                                  </p:stCondLst>
+                                  <p:childTnLst>
+                                    <p:set>
+                                      <p:cBhvr>
+                                        <p:cTn id="6" dur="1" fill="hold">
+                                          <p:stCondLst>
+                                            <p:cond delay="0"/>
+                                          </p:stCondLst>
+                                        </p:cTn>
+                                        <p:tgtEl>
+                                          <p:spTgt spid="5">
+                                            <p:txEl>
+                                              <p:pRg st="0" end="0"/>
+                                            </p:txEl>
+                                          </p:spTgt>
+                                        </p:tgtEl>
+                                        <p:attrNameLst>
+                                          <p:attrName>style.visibility</p:attrName>
+                                        </p:attrNameLst>
+                                      </p:cBhvr>
+                                      <p:to>
+                                        <p:strVal val="visible"/>
+                                      </p:to>
+                                    </p:set>
+                                  </p:childTnLst>
+                                </p:cTn>
+                              </p:par>
+                              <p:par>
+                                <p:cTn id="7" presetID="1" presetClass="entr" presetSubtype="0" fill="hold" grpId="0" nodeType="withEffect">
+                                  <p:stCondLst>
+                                    <p:cond delay="0"/>
+                                  </p:stCondLst>
+                                  <p:childTnLst>
+                                    <p:set>
+                                      <p:cBhvr>
+                                        <p:cTn id="8" dur="1" fill="hold">
+                                          <p:stCondLst>
+                                            <p:cond delay="0"/>
+                                          </p:stCondLst>
+                                        </p:cTn>
+                                        <p:tgtEl>
+                                          <p:spTgt spid="5">
+                                            <p:txEl>
+                                              <p:pRg st="1" end="1"/>
+                                            </p:txEl>
+                                          </p:spTgt>
+                                        </p:tgtEl>
+                                        <p:attrNameLst>
+                                          <p:attrName>style.visibility</p:attrName>
+                                        </p:attrNameLst>
+                                      </p:cBhvr>
+                                      <p:to>
+                                        <p:strVal val="visible"/>
+                                      </p:to>
+                                    </p:set>
+                                  </p:childTnLst>
+                                </p:cTn>
+                              </p:par>
+                            </p:childTnLst>
+                          </p:cTn>
+                        </p:par>
+                      </p:childTnLst>
+                    </p:cTn>
+                  </p:par>
+                  <p:par>
+                    <p:cTn id="9" fill="hold">
+                      <p:stCondLst>
+                        <p:cond delay="indefinite"/>
+                      </p:stCondLst>
+                      <p:childTnLst>
+                        <p:par>
+                          <p:cTn id="10" fill="hold">
+                            <p:stCondLst>
+                              <p:cond delay="0"/>
+                            </p:stCondLst>
+                            <p:childTnLst>
+                              <p:par>
+                                <p:cTn id="11" presetID="1" presetClass="entr" presetSubtype="0" fill="hold" grpId="0" nodeType="clickEffect">
+                                  <p:stCondLst>
+                                    <p:cond delay="0"/>
+                                  </p:stCondLst>
+                                  <p:childTnLst>
+                                    <p:set>
+                                      <p:cBhvr>
+                                        <p:cTn id="12" dur="1" fill="hold">
+                                          <p:stCondLst>
+                                            <p:cond delay="0"/>
+                                          </p:stCondLst>
+                                        </p:cTn>
+                                        <p:tgtEl>
+                                          <p:spTgt spid="5">
+                                            <p:txEl>
+                                              <p:pRg st="2" end="2"/>
+                                            </p:txEl>
+                                          </p:spTgt>
+                                        </p:tgtEl>
+                                        <p:attrNameLst>
+                                          <p:attrName>style.visibility</p:attrName>
+                                        </p:attrNameLst>
+                                      </p:cBhvr>
+                                      <p:to>
+                                        <p:strVal val="visible"/>
+                                      </p:to>
+                                    </p:set>
+                                  </p:childTnLst>
+                                </p:cTn>
+                              </p:par>
+                              <p:par>
+                                <p:cTn id="13" presetID="1" presetClass="entr" presetSubtype="0" fill="hold" grpId="0" nodeType="withEffect">
+                                  <p:stCondLst>
+                                    <p:cond delay="0"/>
+                                  </p:stCondLst>
+                                  <p:childTnLst>
+                                    <p:set>
+                                      <p:cBhvr>
+                                        <p:cTn id="14" dur="1" fill="hold">
+                                          <p:stCondLst>
+                                            <p:cond delay="0"/>
+                                          </p:stCondLst>
+                                        </p:cTn>
+                                        <p:tgtEl>
+                                          <p:spTgt spid="5">
+                                            <p:txEl>
+                                              <p:pRg st="3" end="3"/>
+                                            </p:txEl>
+                                          </p:spTgt>
+                                        </p:tgtEl>
+                                        <p:attrNameLst>
+                                          <p:attrName>style.visibility</p:attrName>
+                                        </p:attrNameLst>
+                                      </p:cBhvr>
+                                      <p:to>
+                                        <p:strVal val="visible"/>
+                                      </p:to>
+                                    </p:set>
+                                  </p:childTnLst>
+                                </p:cTn>
+                              </p:par>
+                            </p:childTnLst>
+                          </p:cTn>
+                        </p:par>
+                      </p:childTnLst>
+                    </p:cTn>
+                  </p:par>
+                  <p:par>
+                    <p:cTn id="15" fill="hold">
+                      <p:stCondLst>
+                        <p:cond delay="indefinite"/>
+                      </p:stCondLst>
+                      <p:childTnLst>
+                        <p:par>
+                          <p:cTn id="16" fill="hold">
+                            <p:stCondLst>
+                              <p:cond delay="0"/>
+                            </p:stCondLst>
+                            <p:childTnLst>
+                              <p:par>
+                                <p:cTn id="17" presetID="1" presetClass="entr" presetSubtype="0" fill="hold" grpId="0" nodeType="clickEffect">
+                                  <p:stCondLst>
+                                    <p:cond delay="0"/>
+                                  </p:stCondLst>
+                                  <p:childTnLst>
+                                    <p:set>
+                                      <p:cBhvr>
+                                        <p:cTn id="18" dur="1" fill="hold">
+                                          <p:stCondLst>
+                                            <p:cond delay="0"/>
+                                          </p:stCondLst>
+                                        </p:cTn>
+                                        <p:tgtEl>
+                                          <p:spTgt spid="5">
+                                            <p:txEl>
+                                              <p:pRg st="4" end="4"/>
+                                            </p:txEl>
+                                          </p:spTgt>
+                                        </p:tgtEl>
+                                        <p:attrNameLst>
+                                          <p:attrName>style.visibility</p:attrName>
+                                        </p:attrNameLst>
+                                      </p:cBhvr>
+                                      <p:to>
+                                        <p:strVal val="visible"/>
+                                      </p:to>
+                                    </p:set>
+                                  </p:childTnLst>
+                                </p:cTn>
+                              </p:par>
+                              <p:par>
+                                <p:cTn id="19" presetID="1" presetClass="entr" presetSubtype="0" fill="hold" grpId="0" nodeType="withEffect">
+                                  <p:stCondLst>
+                                    <p:cond delay="0"/>
+                                  </p:stCondLst>
+                                  <p:childTnLst>
+                                    <p:set>
+                                      <p:cBhvr>
+                                        <p:cTn id="20" dur="1" fill="hold">
+                                          <p:stCondLst>
+                                            <p:cond delay="0"/>
+                                          </p:stCondLst>
+                                        </p:cTn>
+                                        <p:tgtEl>
+                                          <p:spTgt spid="5">
+                                            <p:txEl>
+                                              <p:pRg st="5" end="5"/>
+                                            </p:txEl>
+                                          </p:spTgt>
+                                        </p:tgtEl>
+                                        <p:attrNameLst>
+                                          <p:attrName>style.visibility</p:attrName>
+                                        </p:attrNameLst>
+                                      </p:cBhvr>
+                                      <p:to>
+                                        <p:strVal val="visible"/>
+                                      </p:to>
+                                    </p:set>
+                                  </p:childTnLst>
+                                </p:cTn>
+                              </p:par>
+                              <p:par>
+                                <p:cTn id="21" presetID="1" presetClass="entr" presetSubtype="0" fill="hold" nodeType="withEffect">
+                                  <p:stCondLst>
+                                    <p:cond delay="0"/>
+                                  </p:stCondLst>
+                                  <p:childTnLst>
+                                    <p:set>
+                                      <p:cBhvr>
+                                        <p:cTn id="22" dur="1" fill="hold">
+                                          <p:stCondLst>
+                                            <p:cond delay="0"/>
+                                          </p:stCondLst>
+                                        </p:cTn>
+                                        <p:tgtEl>
+                                          <p:spTgt spid="1026"/>
+                                        </p:tgtEl>
+                                        <p:attrNameLst>
+                                          <p:attrName>style.visibility</p:attrName>
+                                        </p:attrNameLst>
+                                      </p:cBhvr>
+                                      <p:to>
+                                        <p:strVal val="visible"/>
+                                      </p:to>
+                                    </p:set>
+                                  </p:childTnLst>
+                                </p:cTn>
+                              </p:par>
+                            </p:childTnLst>
+                          </p:cTn>
+                        </p:par>
+                      </p:childTnLst>
+                    </p:cTn>
+                  </p:par>
+                </p:childTnLst>
+              </p:cTn>
+              <p:prevCondLst>
+                <p:cond evt="onPrev" delay="0">
+                  <p:tgtEl>
+                    <p:sldTgt/>
+                  </p:tgtEl>
+                </p:cond>
+              </p:prevCondLst>
+              <p:nextCondLst>
+                <p:cond evt="onNext" delay="0">
+                  <p:tgtEl>
+                    <p:sldTgt/>
+                  </p:tgtEl>
+                </p:cond>
+              </p:nextCondLst>
+            </p:seq>
+          </p:childTnLst>
+        </p:cTn>
+      </p:par>
+    </p:tnLst>
+    <p:bldLst>
+      <p:bldP spid="5" grpId="0" uiExpand="1" build="p"/>
+    </p:bldLst>
+  </p:timing>
+</p:sld>
+</file>
+
+<file path=ppt/slides/slide39.xml><?xml version="1.0" encoding="utf-8"?>
+<p:sld xmlns:a="http://schemas.openxmlformats.org/drawingml/2006/main" xmlns:r="http://schemas.openxmlformats.org/officeDocument/2006/relationships" xmlns:p="http://schemas.openxmlformats.org/presentationml/2006/main">
+  <p:cSld>
+    <p:spTree>
+      <p:nvGrpSpPr>
+        <p:cNvPr id="1" name=""/>
+        <p:cNvGrpSpPr/>
+        <p:nvPr/>
+      </p:nvGrpSpPr>
+      <p:grpSpPr>
+        <a:xfrm>
+          <a:off x="0" y="0"/>
+          <a:ext cx="0" cy="0"/>
+          <a:chOff x="0" y="0"/>
+          <a:chExt cx="0" cy="0"/>
+        </a:xfrm>
+      </p:grpSpPr>
+      <p:sp>
+        <p:nvSpPr>
+          <p:cNvPr id="3" name="Titel 2"/>
+          <p:cNvSpPr>
+            <a:spLocks noGrp="1"/>
+          </p:cNvSpPr>
+          <p:nvPr>
+            <p:ph type="title"/>
+          </p:nvPr>
+        </p:nvSpPr>
+        <p:spPr/>
+        <p:txBody>
+          <a:bodyPr/>
+          <a:lstStyle/>
+          <a:p>
+            <a:r>
+              <a:rPr lang="de-DE" sz="2400" b="1" dirty="0" smtClean="0"/>
+              <a:t>Ausblick:</a:t>
+            </a:r>
+            <a:r>
+              <a:rPr lang="de-DE" sz="2400" dirty="0" smtClean="0"/>
+              <a:t>	</a:t>
+            </a:r>
+            <a:r>
+              <a:rPr lang="de-DE" dirty="0" smtClean="0"/>
+              <a:t>Inferenzverfahren</a:t>
+            </a:r>
+            <a:endParaRPr lang="de-DE" dirty="0"/>
+          </a:p>
+        </p:txBody>
+      </p:sp>
+      <p:sp>
+        <p:nvSpPr>
+          <p:cNvPr id="2" name="Foliennummernplatzhalter 1"/>
+          <p:cNvSpPr>
+            <a:spLocks noGrp="1"/>
+          </p:cNvSpPr>
+          <p:nvPr>
+            <p:ph type="sldNum" sz="quarter" idx="12"/>
+          </p:nvPr>
+        </p:nvSpPr>
+        <p:spPr/>
+        <p:txBody>
+          <a:bodyPr/>
+          <a:lstStyle/>
+          <a:p>
+            <a:fld id="{F4DAF760-8A09-427D-9634-9AF01F07ABD5}" type="slidenum">
+              <a:rPr lang="de-DE" smtClean="0"/>
+              <a:t>39</a:t>
+            </a:fld>
+            <a:endParaRPr lang="de-DE" dirty="0"/>
+          </a:p>
+        </p:txBody>
+      </p:sp>
+      <p:sp>
+        <p:nvSpPr>
+          <p:cNvPr id="5" name="Inhaltsplatzhalter 4"/>
+          <p:cNvSpPr txBox="1">
+            <a:spLocks/>
+          </p:cNvSpPr>
+          <p:nvPr/>
+        </p:nvSpPr>
+        <p:spPr>
+          <a:xfrm>
+            <a:off x="623392" y="1124745"/>
+            <a:ext cx="10945216" cy="4392487"/>
+          </a:xfrm>
+          <a:prstGeom prst="rect">
+            <a:avLst/>
+          </a:prstGeom>
+        </p:spPr>
+        <p:txBody>
+          <a:bodyPr anchor="ctr">
+            <a:normAutofit/>
+          </a:bodyPr>
+          <a:lstStyle>
+            <a:lvl1pPr marL="228600" indent="-228600" algn="l" defTabSz="914400" rtl="0" eaLnBrk="1" latinLnBrk="0" hangingPunct="1">
+              <a:lnSpc>
+                <a:spcPct val="90000"/>
+              </a:lnSpc>
+              <a:spcBef>
+                <a:spcPts val="1000"/>
+              </a:spcBef>
+              <a:buFont typeface="Arial" panose="020B0604020202020204" pitchFamily="34" charset="0"/>
+              <a:buChar char="•"/>
+              <a:defRPr sz="2800" kern="1200">
+                <a:solidFill>
+                  <a:schemeClr val="tx1"/>
+                </a:solidFill>
+                <a:latin typeface="Roboto Light" panose="02000000000000000000" pitchFamily="2" charset="0"/>
+                <a:ea typeface="Roboto Light" panose="02000000000000000000" pitchFamily="2" charset="0"/>
+                <a:cs typeface="+mn-cs"/>
+              </a:defRPr>
+            </a:lvl1pPr>
+            <a:lvl2pPr marL="685800" indent="-228600" algn="l" defTabSz="914400" rtl="0" eaLnBrk="1" latinLnBrk="0" hangingPunct="1">
+              <a:lnSpc>
+                <a:spcPct val="90000"/>
+              </a:lnSpc>
+              <a:spcBef>
+                <a:spcPts val="500"/>
+              </a:spcBef>
+              <a:buFont typeface="Arial" panose="020B0604020202020204" pitchFamily="34" charset="0"/>
+              <a:buChar char="•"/>
+              <a:defRPr sz="2400" kern="1200">
+                <a:solidFill>
+                  <a:schemeClr val="tx1"/>
+                </a:solidFill>
+                <a:latin typeface="Roboto Light" panose="02000000000000000000" pitchFamily="2" charset="0"/>
+                <a:ea typeface="Roboto Light" panose="02000000000000000000" pitchFamily="2" charset="0"/>
+                <a:cs typeface="+mn-cs"/>
+              </a:defRPr>
+            </a:lvl2pPr>
+            <a:lvl3pPr marL="1143000" indent="-228600" algn="l" defTabSz="914400" rtl="0" eaLnBrk="1" latinLnBrk="0" hangingPunct="1">
+              <a:lnSpc>
+                <a:spcPct val="90000"/>
+              </a:lnSpc>
+              <a:spcBef>
+                <a:spcPts val="500"/>
+              </a:spcBef>
+              <a:buFont typeface="Arial" panose="020B0604020202020204" pitchFamily="34" charset="0"/>
+              <a:buChar char="•"/>
+              <a:defRPr sz="2000" kern="1200">
+                <a:solidFill>
+                  <a:schemeClr val="tx1"/>
+                </a:solidFill>
+                <a:latin typeface="Roboto Light" panose="02000000000000000000" pitchFamily="2" charset="0"/>
+                <a:ea typeface="Roboto Light" panose="02000000000000000000" pitchFamily="2" charset="0"/>
+                <a:cs typeface="+mn-cs"/>
+              </a:defRPr>
+            </a:lvl3pPr>
+            <a:lvl4pPr marL="1600200" indent="-228600" algn="l" defTabSz="914400" rtl="0" eaLnBrk="1" latinLnBrk="0" hangingPunct="1">
+              <a:lnSpc>
+                <a:spcPct val="90000"/>
+              </a:lnSpc>
+              <a:spcBef>
+                <a:spcPts val="500"/>
+              </a:spcBef>
+              <a:buFont typeface="Arial" panose="020B0604020202020204" pitchFamily="34" charset="0"/>
+              <a:buChar char="•"/>
+              <a:defRPr sz="1800" kern="1200">
+                <a:solidFill>
+                  <a:schemeClr val="tx1"/>
+                </a:solidFill>
+                <a:latin typeface="Roboto Light" panose="02000000000000000000" pitchFamily="2" charset="0"/>
+                <a:ea typeface="Roboto Light" panose="02000000000000000000" pitchFamily="2" charset="0"/>
+                <a:cs typeface="+mn-cs"/>
+              </a:defRPr>
+            </a:lvl4pPr>
+            <a:lvl5pPr marL="2057400" indent="-228600" algn="l" defTabSz="914400" rtl="0" eaLnBrk="1" latinLnBrk="0" hangingPunct="1">
+              <a:lnSpc>
+                <a:spcPct val="90000"/>
+              </a:lnSpc>
+              <a:spcBef>
+                <a:spcPts val="500"/>
+              </a:spcBef>
+              <a:buFont typeface="Arial" panose="020B0604020202020204" pitchFamily="34" charset="0"/>
+              <a:buChar char="•"/>
+              <a:defRPr sz="1800" kern="1200">
+                <a:solidFill>
+                  <a:schemeClr val="tx1"/>
+                </a:solidFill>
+                <a:latin typeface="Roboto Light" panose="02000000000000000000" pitchFamily="2" charset="0"/>
+                <a:ea typeface="Roboto Light" panose="02000000000000000000" pitchFamily="2" charset="0"/>
+                <a:cs typeface="+mn-cs"/>
+              </a:defRPr>
+            </a:lvl5pPr>
+            <a:lvl6pPr marL="2514600" indent="-228600" algn="l" defTabSz="914400" rtl="0" eaLnBrk="1" latinLnBrk="0" hangingPunct="1">
+              <a:lnSpc>
+                <a:spcPct val="90000"/>
+              </a:lnSpc>
+              <a:spcBef>
+                <a:spcPts val="500"/>
+              </a:spcBef>
+              <a:buFont typeface="Arial" panose="020B0604020202020204" pitchFamily="34" charset="0"/>
+              <a:buChar char="•"/>
+              <a:defRPr sz="1800" kern="1200">
+                <a:solidFill>
+                  <a:schemeClr val="tx1"/>
+                </a:solidFill>
+                <a:latin typeface="+mn-lt"/>
+                <a:ea typeface="+mn-ea"/>
+                <a:cs typeface="+mn-cs"/>
+              </a:defRPr>
+            </a:lvl6pPr>
+            <a:lvl7pPr marL="2971800" indent="-228600" algn="l" defTabSz="914400" rtl="0" eaLnBrk="1" latinLnBrk="0" hangingPunct="1">
+              <a:lnSpc>
+                <a:spcPct val="90000"/>
+              </a:lnSpc>
+              <a:spcBef>
+                <a:spcPts val="500"/>
+              </a:spcBef>
+              <a:buFont typeface="Arial" panose="020B0604020202020204" pitchFamily="34" charset="0"/>
+              <a:buChar char="•"/>
+              <a:defRPr sz="1800" kern="1200">
+                <a:solidFill>
+                  <a:schemeClr val="tx1"/>
+                </a:solidFill>
+                <a:latin typeface="+mn-lt"/>
+                <a:ea typeface="+mn-ea"/>
+                <a:cs typeface="+mn-cs"/>
+              </a:defRPr>
+            </a:lvl7pPr>
+            <a:lvl8pPr marL="3429000" indent="-228600" algn="l" defTabSz="914400" rtl="0" eaLnBrk="1" latinLnBrk="0" hangingPunct="1">
+              <a:lnSpc>
+                <a:spcPct val="90000"/>
+              </a:lnSpc>
+              <a:spcBef>
+                <a:spcPts val="500"/>
+              </a:spcBef>
+              <a:buFont typeface="Arial" panose="020B0604020202020204" pitchFamily="34" charset="0"/>
+              <a:buChar char="•"/>
+              <a:defRPr sz="1800" kern="1200">
+                <a:solidFill>
+                  <a:schemeClr val="tx1"/>
+                </a:solidFill>
+                <a:latin typeface="+mn-lt"/>
+                <a:ea typeface="+mn-ea"/>
+                <a:cs typeface="+mn-cs"/>
+              </a:defRPr>
+            </a:lvl8pPr>
+            <a:lvl9pPr marL="3886200" indent="-228600" algn="l" defTabSz="914400" rtl="0" eaLnBrk="1" latinLnBrk="0" hangingPunct="1">
+              <a:lnSpc>
+                <a:spcPct val="90000"/>
+              </a:lnSpc>
+              <a:spcBef>
+                <a:spcPts val="500"/>
+              </a:spcBef>
+              <a:buFont typeface="Arial" panose="020B0604020202020204" pitchFamily="34" charset="0"/>
+              <a:buChar char="•"/>
+              <a:defRPr sz="1800" kern="1200">
+                <a:solidFill>
+                  <a:schemeClr val="tx1"/>
+                </a:solidFill>
+                <a:latin typeface="+mn-lt"/>
+                <a:ea typeface="+mn-ea"/>
+                <a:cs typeface="+mn-cs"/>
+              </a:defRPr>
+            </a:lvl9pPr>
+          </a:lstStyle>
+          <a:p>
+            <a:pPr fontAlgn="auto">
+              <a:lnSpc>
+                <a:spcPct val="200000"/>
+              </a:lnSpc>
+              <a:spcAft>
+                <a:spcPts val="0"/>
+              </a:spcAft>
+            </a:pPr>
+            <a:r>
+              <a:rPr lang="de-DE" sz="2400" dirty="0" smtClean="0"/>
+              <a:t>Bislang Nutzung der ADMM-Implementation der PSL-</a:t>
+            </a:r>
+            <a:r>
+              <a:rPr lang="de-DE" sz="2400" dirty="0" err="1" smtClean="0"/>
+              <a:t>Referenzimplementation</a:t>
+            </a:r>
+            <a:endParaRPr lang="de-DE" sz="2400" dirty="0" smtClean="0"/>
+          </a:p>
+          <a:p>
+            <a:pPr lvl="1" fontAlgn="auto">
+              <a:lnSpc>
+                <a:spcPct val="200000"/>
+              </a:lnSpc>
+              <a:spcAft>
+                <a:spcPts val="0"/>
+              </a:spcAft>
+              <a:buFont typeface="Wingdings" panose="05000000000000000000" pitchFamily="2" charset="2"/>
+              <a:buChar char="Ø"/>
+            </a:pPr>
+            <a:r>
+              <a:rPr lang="de-DE" sz="2000" dirty="0" smtClean="0"/>
+              <a:t>Umstieg auf eine verteilte ADMM-Implementation, z. B. auf Basis von </a:t>
+            </a:r>
+            <a:r>
+              <a:rPr lang="de-DE" sz="2000" i="1" dirty="0" err="1" smtClean="0"/>
+              <a:t>Hadoop</a:t>
+            </a:r>
+            <a:r>
+              <a:rPr lang="de-DE" sz="2000" i="1" dirty="0" smtClean="0"/>
+              <a:t> </a:t>
+            </a:r>
+            <a:r>
+              <a:rPr lang="de-DE" sz="2000" i="1" dirty="0" err="1" smtClean="0"/>
+              <a:t>MapReduce</a:t>
+            </a:r>
+            <a:endParaRPr lang="de-DE" sz="2000" i="1" dirty="0" smtClean="0"/>
+          </a:p>
+          <a:p>
+            <a:pPr fontAlgn="auto">
+              <a:lnSpc>
+                <a:spcPct val="200000"/>
+              </a:lnSpc>
+              <a:spcAft>
+                <a:spcPts val="0"/>
+              </a:spcAft>
+            </a:pPr>
+            <a:r>
+              <a:rPr lang="de-DE" sz="2400" dirty="0" smtClean="0"/>
+              <a:t>Vollständige ADMM-Inferenz nach jeder eingefügten Nachricht</a:t>
+            </a:r>
+          </a:p>
+          <a:p>
+            <a:pPr lvl="1" fontAlgn="auto">
+              <a:lnSpc>
+                <a:spcPct val="200000"/>
+              </a:lnSpc>
+              <a:spcAft>
+                <a:spcPts val="0"/>
+              </a:spcAft>
+              <a:buFont typeface="Wingdings" panose="05000000000000000000" pitchFamily="2" charset="2"/>
+              <a:buChar char="Ø"/>
+            </a:pPr>
+            <a:r>
+              <a:rPr lang="de-DE" sz="2000" dirty="0" smtClean="0"/>
+              <a:t>Weiterentwicklung und Integration von </a:t>
+            </a:r>
+            <a:r>
+              <a:rPr lang="de-DE" sz="2000" i="1" dirty="0" smtClean="0"/>
+              <a:t>BOCI</a:t>
+            </a:r>
+            <a:r>
+              <a:rPr lang="de-DE" sz="2000" dirty="0" smtClean="0"/>
+              <a:t> (</a:t>
+            </a:r>
+            <a:r>
+              <a:rPr lang="de-DE" sz="2000" b="1" dirty="0" err="1" smtClean="0"/>
+              <a:t>B</a:t>
+            </a:r>
+            <a:r>
+              <a:rPr lang="de-DE" sz="2000" dirty="0" err="1" smtClean="0"/>
+              <a:t>udgeted</a:t>
+            </a:r>
+            <a:r>
+              <a:rPr lang="de-DE" sz="2000" dirty="0" smtClean="0"/>
+              <a:t> </a:t>
+            </a:r>
+            <a:r>
+              <a:rPr lang="de-DE" sz="2000" b="1" dirty="0" smtClean="0"/>
+              <a:t>O</a:t>
+            </a:r>
+            <a:r>
+              <a:rPr lang="de-DE" sz="2000" dirty="0" smtClean="0"/>
+              <a:t>nline </a:t>
+            </a:r>
+            <a:r>
+              <a:rPr lang="de-DE" sz="2000" b="1" dirty="0" smtClean="0"/>
+              <a:t>C</a:t>
+            </a:r>
+            <a:r>
+              <a:rPr lang="de-DE" sz="2000" dirty="0" smtClean="0"/>
+              <a:t>ollective </a:t>
+            </a:r>
+            <a:r>
+              <a:rPr lang="de-DE" sz="2000" b="1" dirty="0" err="1" smtClean="0"/>
+              <a:t>I</a:t>
+            </a:r>
+            <a:r>
+              <a:rPr lang="de-DE" sz="2000" dirty="0" err="1" smtClean="0"/>
+              <a:t>nference</a:t>
+            </a:r>
+            <a:r>
+              <a:rPr lang="de-DE" sz="2000" dirty="0" smtClean="0"/>
+              <a:t>)</a:t>
+            </a:r>
+          </a:p>
+          <a:p>
+            <a:pPr marL="457200" lvl="1" indent="0" fontAlgn="auto">
+              <a:lnSpc>
+                <a:spcPct val="200000"/>
+              </a:lnSpc>
+              <a:spcAft>
+                <a:spcPts val="0"/>
+              </a:spcAft>
+              <a:buNone/>
+            </a:pPr>
+            <a:r>
+              <a:rPr lang="de-DE" sz="2000" dirty="0" smtClean="0"/>
+              <a:t>    Reduktion der Inferenzdauer um 65%, ohne Verschlechterung des Ergebnisses</a:t>
+            </a:r>
+            <a:endParaRPr lang="de-DE" sz="2000" dirty="0"/>
+          </a:p>
+        </p:txBody>
+      </p:sp>
+      <p:graphicFrame>
+        <p:nvGraphicFramePr>
+          <p:cNvPr id="6" name="Diagramm 5"/>
+          <p:cNvGraphicFramePr/>
+          <p:nvPr>
+            <p:extLst>
+              <p:ext uri="{D42A27DB-BD31-4B8C-83A1-F6EECF244321}">
+                <p14:modId xmlns:p14="http://schemas.microsoft.com/office/powerpoint/2010/main" val="3367471763"/>
+              </p:ext>
+            </p:extLst>
+          </p:nvPr>
+        </p:nvGraphicFramePr>
+        <p:xfrm>
+          <a:off x="3089277" y="3356992"/>
+          <a:ext cx="6013446" cy="2970395"/>
+        </p:xfrm>
+        <a:graphic>
+          <a:graphicData uri="http://schemas.openxmlformats.org/drawingml/2006/chart">
+            <c:chart xmlns:c="http://schemas.openxmlformats.org/drawingml/2006/chart" xmlns:r="http://schemas.openxmlformats.org/officeDocument/2006/relationships" r:id="rId2"/>
+          </a:graphicData>
+        </a:graphic>
+      </p:graphicFrame>
+    </p:spTree>
+    <p:extLst>
+      <p:ext uri="{BB962C8B-B14F-4D97-AF65-F5344CB8AC3E}">
+        <p14:creationId xmlns:p14="http://schemas.microsoft.com/office/powerpoint/2010/main" val="1894764074"/>
+      </p:ext>
+    </p:extLst>
+  </p:cSld>
+  <p:clrMapOvr>
+    <a:masterClrMapping/>
+  </p:clrMapOvr>
+  <p:timing>
+    <p:tnLst>
+      <p:par>
+        <p:cTn id="1" dur="indefinite" restart="never" nodeType="tmRoot">
+          <p:childTnLst>
+            <p:seq concurrent="1" nextAc="seek">
+              <p:cTn id="2" dur="indefinite" nodeType="mainSeq">
+                <p:childTnLst>
+                  <p:par>
+                    <p:cTn id="3" fill="hold">
+                      <p:stCondLst>
+                        <p:cond delay="indefinite"/>
+                      </p:stCondLst>
+                      <p:childTnLst>
+                        <p:par>
+                          <p:cTn id="4" fill="hold">
+                            <p:stCondLst>
+                              <p:cond delay="0"/>
+                            </p:stCondLst>
+                            <p:childTnLst>
+                              <p:par>
+                                <p:cTn id="5" presetID="1" presetClass="entr" presetSubtype="0" fill="hold" grpId="0" nodeType="clickEffect">
+                                  <p:stCondLst>
+                                    <p:cond delay="0"/>
+                                  </p:stCondLst>
+                                  <p:childTnLst>
+                                    <p:set>
+                                      <p:cBhvr>
+                                        <p:cTn id="6" dur="1" fill="hold">
+                                          <p:stCondLst>
+                                            <p:cond delay="0"/>
+                                          </p:stCondLst>
+                                        </p:cTn>
+                                        <p:tgtEl>
+                                          <p:spTgt spid="5">
+                                            <p:txEl>
+                                              <p:pRg st="0" end="0"/>
+                                            </p:txEl>
+                                          </p:spTgt>
+                                        </p:tgtEl>
+                                        <p:attrNameLst>
+                                          <p:attrName>style.visibility</p:attrName>
+                                        </p:attrNameLst>
+                                      </p:cBhvr>
+                                      <p:to>
+                                        <p:strVal val="visible"/>
+                                      </p:to>
+                                    </p:set>
+                                  </p:childTnLst>
+                                </p:cTn>
+                              </p:par>
+                              <p:par>
+                                <p:cTn id="7" presetID="1" presetClass="entr" presetSubtype="0" fill="hold" grpId="0" nodeType="withEffect">
+                                  <p:stCondLst>
+                                    <p:cond delay="0"/>
+                                  </p:stCondLst>
+                                  <p:childTnLst>
+                                    <p:set>
+                                      <p:cBhvr>
+                                        <p:cTn id="8" dur="1" fill="hold">
+                                          <p:stCondLst>
+                                            <p:cond delay="0"/>
+                                          </p:stCondLst>
+                                        </p:cTn>
+                                        <p:tgtEl>
+                                          <p:spTgt spid="5">
+                                            <p:txEl>
+                                              <p:pRg st="1" end="1"/>
+                                            </p:txEl>
+                                          </p:spTgt>
+                                        </p:tgtEl>
+                                        <p:attrNameLst>
+                                          <p:attrName>style.visibility</p:attrName>
+                                        </p:attrNameLst>
+                                      </p:cBhvr>
+                                      <p:to>
+                                        <p:strVal val="visible"/>
+                                      </p:to>
+                                    </p:set>
+                                  </p:childTnLst>
+                                </p:cTn>
+                              </p:par>
+                              <p:par>
+                                <p:cTn id="9" presetID="1" presetClass="entr" presetSubtype="0" fill="hold" grpId="1" nodeType="withEffect">
+                                  <p:stCondLst>
+                                    <p:cond delay="0"/>
+                                  </p:stCondLst>
+                                  <p:childTnLst>
+                                    <p:set>
+                                      <p:cBhvr>
+                                        <p:cTn id="10" dur="1" fill="hold">
+                                          <p:stCondLst>
+                                            <p:cond delay="0"/>
+                                          </p:stCondLst>
+                                        </p:cTn>
+                                        <p:tgtEl>
+                                          <p:spTgt spid="6"/>
+                                        </p:tgtEl>
+                                        <p:attrNameLst>
+                                          <p:attrName>style.visibility</p:attrName>
+                                        </p:attrNameLst>
+                                      </p:cBhvr>
+                                      <p:to>
+                                        <p:strVal val="visible"/>
+                                      </p:to>
+                                    </p:set>
+                                  </p:childTnLst>
+                                </p:cTn>
+                              </p:par>
+                            </p:childTnLst>
+                          </p:cTn>
+                        </p:par>
+                      </p:childTnLst>
+                    </p:cTn>
+                  </p:par>
+                  <p:par>
+                    <p:cTn id="11" fill="hold">
+                      <p:stCondLst>
+                        <p:cond delay="indefinite"/>
+                      </p:stCondLst>
+                      <p:childTnLst>
+                        <p:par>
+                          <p:cTn id="12" fill="hold">
+                            <p:stCondLst>
+                              <p:cond delay="0"/>
+                            </p:stCondLst>
+                            <p:childTnLst>
+                              <p:par>
+                                <p:cTn id="13" presetID="1" presetClass="entr" presetSubtype="0" fill="hold" grpId="0" nodeType="clickEffect">
+                                  <p:stCondLst>
+                                    <p:cond delay="0"/>
+                                  </p:stCondLst>
+                                  <p:childTnLst>
+                                    <p:set>
+                                      <p:cBhvr>
+                                        <p:cTn id="14" dur="1" fill="hold">
+                                          <p:stCondLst>
+                                            <p:cond delay="0"/>
+                                          </p:stCondLst>
+                                        </p:cTn>
+                                        <p:tgtEl>
+                                          <p:spTgt spid="5">
+                                            <p:txEl>
+                                              <p:pRg st="2" end="2"/>
+                                            </p:txEl>
+                                          </p:spTgt>
+                                        </p:tgtEl>
+                                        <p:attrNameLst>
+                                          <p:attrName>style.visibility</p:attrName>
+                                        </p:attrNameLst>
+                                      </p:cBhvr>
+                                      <p:to>
+                                        <p:strVal val="visible"/>
+                                      </p:to>
+                                    </p:set>
+                                  </p:childTnLst>
+                                </p:cTn>
+                              </p:par>
+                              <p:par>
+                                <p:cTn id="15" presetID="1" presetClass="exit" presetSubtype="0" fill="hold" grpId="0" nodeType="withEffect">
+                                  <p:stCondLst>
+                                    <p:cond delay="0"/>
+                                  </p:stCondLst>
+                                  <p:childTnLst>
+                                    <p:set>
+                                      <p:cBhvr>
+                                        <p:cTn id="16" dur="1" fill="hold">
+                                          <p:stCondLst>
+                                            <p:cond delay="0"/>
+                                          </p:stCondLst>
+                                        </p:cTn>
+                                        <p:tgtEl>
+                                          <p:spTgt spid="6"/>
+                                        </p:tgtEl>
+                                        <p:attrNameLst>
+                                          <p:attrName>style.visibility</p:attrName>
+                                        </p:attrNameLst>
+                                      </p:cBhvr>
+                                      <p:to>
+                                        <p:strVal val="hidden"/>
+                                      </p:to>
+                                    </p:set>
+                                  </p:childTnLst>
+                                </p:cTn>
+                              </p:par>
+                              <p:par>
+                                <p:cTn id="17" presetID="1" presetClass="entr" presetSubtype="0" fill="hold" grpId="0" nodeType="withEffect">
+                                  <p:stCondLst>
+                                    <p:cond delay="0"/>
+                                  </p:stCondLst>
+                                  <p:childTnLst>
+                                    <p:set>
+                                      <p:cBhvr>
+                                        <p:cTn id="18" dur="1" fill="hold">
+                                          <p:stCondLst>
+                                            <p:cond delay="0"/>
+                                          </p:stCondLst>
+                                        </p:cTn>
+                                        <p:tgtEl>
+                                          <p:spTgt spid="5">
+                                            <p:txEl>
+                                              <p:pRg st="3" end="3"/>
+                                            </p:txEl>
+                                          </p:spTgt>
+                                        </p:tgtEl>
+                                        <p:attrNameLst>
+                                          <p:attrName>style.visibility</p:attrName>
+                                        </p:attrNameLst>
+                                      </p:cBhvr>
+                                      <p:to>
+                                        <p:strVal val="visible"/>
+                                      </p:to>
+                                    </p:set>
+                                  </p:childTnLst>
+                                </p:cTn>
+                              </p:par>
+                              <p:par>
+                                <p:cTn id="19" presetID="1" presetClass="entr" presetSubtype="0" fill="hold" grpId="0" nodeType="withEffect">
+                                  <p:stCondLst>
+                                    <p:cond delay="0"/>
+                                  </p:stCondLst>
+                                  <p:childTnLst>
+                                    <p:set>
+                                      <p:cBhvr>
+                                        <p:cTn id="20" dur="1" fill="hold">
+                                          <p:stCondLst>
+                                            <p:cond delay="0"/>
+                                          </p:stCondLst>
+                                        </p:cTn>
+                                        <p:tgtEl>
+                                          <p:spTgt spid="5">
+                                            <p:txEl>
+                                              <p:pRg st="4" end="4"/>
+                                            </p:txEl>
+                                          </p:spTgt>
+                                        </p:tgtEl>
+                                        <p:attrNameLst>
+                                          <p:attrName>style.visibility</p:attrName>
+                                        </p:attrNameLst>
+                                      </p:cBhvr>
+                                      <p:to>
+                                        <p:strVal val="visible"/>
+                                      </p:to>
+                                    </p:set>
+                                  </p:childTnLst>
+                                </p:cTn>
+                              </p:par>
+                            </p:childTnLst>
+                          </p:cTn>
+                        </p:par>
+                      </p:childTnLst>
+                    </p:cTn>
+                  </p:par>
+                </p:childTnLst>
+              </p:cTn>
+              <p:prevCondLst>
+                <p:cond evt="onPrev" delay="0">
+                  <p:tgtEl>
+                    <p:sldTgt/>
+                  </p:tgtEl>
+                </p:cond>
+              </p:prevCondLst>
+              <p:nextCondLst>
+                <p:cond evt="onNext" delay="0">
+                  <p:tgtEl>
+                    <p:sldTgt/>
+                  </p:tgtEl>
+                </p:cond>
+              </p:nextCondLst>
+            </p:seq>
+          </p:childTnLst>
+        </p:cTn>
+      </p:par>
+    </p:tnLst>
+    <p:bldLst>
+      <p:bldP spid="5" grpId="0" uiExpand="1" build="p"/>
+      <p:bldGraphic spid="6" grpId="0">
+        <p:bldAsOne/>
+      </p:bldGraphic>
+      <p:bldGraphic spid="6" grpId="1">
+        <p:bldAsOne/>
+      </p:bldGraphic>
+    </p:bldLst>
   </p:timing>
 </p:sld>
 </file>
@@ -18478,6 +21453,145 @@
     <p:bldLst>
       <p:bldP spid="2048" grpId="0" animBg="1"/>
     </p:bldLst>
+  </p:timing>
+</p:sld>
+</file>
+
+<file path=ppt/slides/slide40.xml><?xml version="1.0" encoding="utf-8"?>
+<p:sld xmlns:a="http://schemas.openxmlformats.org/drawingml/2006/main" xmlns:r="http://schemas.openxmlformats.org/officeDocument/2006/relationships" xmlns:p="http://schemas.openxmlformats.org/presentationml/2006/main">
+  <p:cSld>
+    <p:spTree>
+      <p:nvGrpSpPr>
+        <p:cNvPr id="1" name=""/>
+        <p:cNvGrpSpPr/>
+        <p:nvPr/>
+      </p:nvGrpSpPr>
+      <p:grpSpPr>
+        <a:xfrm>
+          <a:off x="0" y="0"/>
+          <a:ext cx="0" cy="0"/>
+          <a:chOff x="0" y="0"/>
+          <a:chExt cx="0" cy="0"/>
+        </a:xfrm>
+      </p:grpSpPr>
+      <p:sp>
+        <p:nvSpPr>
+          <p:cNvPr id="2" name="Titel 1"/>
+          <p:cNvSpPr>
+            <a:spLocks noGrp="1"/>
+          </p:cNvSpPr>
+          <p:nvPr>
+            <p:ph type="title"/>
+          </p:nvPr>
+        </p:nvSpPr>
+        <p:spPr>
+          <a:xfrm>
+            <a:off x="831851" y="1772817"/>
+            <a:ext cx="10515600" cy="3816424"/>
+          </a:xfrm>
+        </p:spPr>
+        <p:txBody>
+          <a:bodyPr anchor="ctr"/>
+          <a:lstStyle/>
+          <a:p>
+            <a:pPr algn="ctr">
+              <a:lnSpc>
+                <a:spcPct val="150000"/>
+              </a:lnSpc>
+            </a:pPr>
+            <a:r>
+              <a:rPr lang="de-DE" smtClean="0"/>
+              <a:t>Danke!</a:t>
+            </a:r>
+            <a:endParaRPr lang="de-DE" dirty="0"/>
+          </a:p>
+        </p:txBody>
+      </p:sp>
+      <p:sp>
+        <p:nvSpPr>
+          <p:cNvPr id="4" name="Foliennummernplatzhalter 3"/>
+          <p:cNvSpPr>
+            <a:spLocks noGrp="1"/>
+          </p:cNvSpPr>
+          <p:nvPr>
+            <p:ph type="sldNum" sz="quarter" idx="12"/>
+          </p:nvPr>
+        </p:nvSpPr>
+        <p:spPr/>
+        <p:txBody>
+          <a:bodyPr/>
+          <a:lstStyle/>
+          <a:p>
+            <a:fld id="{F4DAF760-8A09-427D-9634-9AF01F07ABD5}" type="slidenum">
+              <a:rPr lang="de-DE" smtClean="0"/>
+              <a:t>40</a:t>
+            </a:fld>
+            <a:endParaRPr lang="de-DE" dirty="0"/>
+          </a:p>
+        </p:txBody>
+      </p:sp>
+      <p:sp>
+        <p:nvSpPr>
+          <p:cNvPr id="6" name="Rechteck 5"/>
+          <p:cNvSpPr/>
+          <p:nvPr/>
+        </p:nvSpPr>
+        <p:spPr>
+          <a:xfrm>
+            <a:off x="9376564" y="1267862"/>
+            <a:ext cx="1904012" cy="1008112"/>
+          </a:xfrm>
+          <a:prstGeom prst="rect">
+            <a:avLst/>
+          </a:prstGeom>
+          <a:solidFill>
+            <a:schemeClr val="bg1"/>
+          </a:solidFill>
+          <a:ln>
+            <a:noFill/>
+          </a:ln>
+        </p:spPr>
+        <p:style>
+          <a:lnRef idx="2">
+            <a:schemeClr val="accent1">
+              <a:shade val="50000"/>
+            </a:schemeClr>
+          </a:lnRef>
+          <a:fillRef idx="1">
+            <a:schemeClr val="accent1"/>
+          </a:fillRef>
+          <a:effectRef idx="0">
+            <a:schemeClr val="accent1"/>
+          </a:effectRef>
+          <a:fontRef idx="minor">
+            <a:schemeClr val="lt1"/>
+          </a:fontRef>
+        </p:style>
+        <p:txBody>
+          <a:bodyPr rtlCol="0" anchor="ctr"/>
+          <a:lstStyle/>
+          <a:p>
+            <a:pPr algn="ctr"/>
+            <a:endParaRPr lang="de-DE"/>
+          </a:p>
+        </p:txBody>
+      </p:sp>
+    </p:spTree>
+    <p:extLst>
+      <p:ext uri="{BB962C8B-B14F-4D97-AF65-F5344CB8AC3E}">
+        <p14:creationId xmlns:p14="http://schemas.microsoft.com/office/powerpoint/2010/main" val="2382665206"/>
+      </p:ext>
+    </p:extLst>
+  </p:cSld>
+  <p:clrMapOvr>
+    <a:masterClrMapping/>
+  </p:clrMapOvr>
+  <p:timing>
+    <p:tnLst>
+      <p:par>
+        <p:cTn id="1" dur="indefinite" restart="never" nodeType="tmRoot"/>
+      </p:par>
+    </p:tnLst>
   </p:timing>
 </p:sld>
 </file>
@@ -21611,7 +24725,7 @@
   <a:extraClrSchemeLst/>
   <a:extLst>
     <a:ext uri="{05A4C25C-085E-4340-85A3-A5531E510DB2}">
-      <thm15:themeFamily xmlns="" xmlns:thm15="http://schemas.microsoft.com/office/thememl/2012/main" name="Office Theme" id="{62F939B6-93AF-4DB8-9C6B-D6C7DFDC589F}" vid="{4A3C46E8-61CC-4603-A589-7422A47A8E4A}"/>
+      <thm15:themeFamily xmlns:thm15="http://schemas.microsoft.com/office/thememl/2012/main" xmlns="" name="Office Theme" id="{62F939B6-93AF-4DB8-9C6B-D6C7DFDC589F}" vid="{4A3C46E8-61CC-4603-A589-7422A47A8E4A}"/>
     </a:ext>
   </a:extLst>
 </a:theme>

</xml_diff>